<commit_message>
update presentation for marketing pitch
</commit_message>
<xml_diff>
--- a/Lingvo/Abgabe/präsentation.pptx
+++ b/Lingvo/Abgabe/präsentation.pptx
@@ -6,7 +6,7 @@
     <p:sldMasterId id="2147483664" r:id="rId2"/>
   </p:sldMasterIdLst>
   <p:notesMasterIdLst>
-    <p:notesMasterId r:id="rId23"/>
+    <p:notesMasterId r:id="rId25"/>
   </p:notesMasterIdLst>
   <p:sldIdLst>
     <p:sldId id="261" r:id="rId3"/>
@@ -14,21 +14,23 @@
     <p:sldId id="267" r:id="rId5"/>
     <p:sldId id="268" r:id="rId6"/>
     <p:sldId id="271" r:id="rId7"/>
-    <p:sldId id="274" r:id="rId8"/>
-    <p:sldId id="272" r:id="rId9"/>
-    <p:sldId id="275" r:id="rId10"/>
-    <p:sldId id="276" r:id="rId11"/>
-    <p:sldId id="277" r:id="rId12"/>
-    <p:sldId id="278" r:id="rId13"/>
-    <p:sldId id="279" r:id="rId14"/>
-    <p:sldId id="280" r:id="rId15"/>
-    <p:sldId id="281" r:id="rId16"/>
-    <p:sldId id="282" r:id="rId17"/>
-    <p:sldId id="283" r:id="rId18"/>
-    <p:sldId id="284" r:id="rId19"/>
-    <p:sldId id="285" r:id="rId20"/>
-    <p:sldId id="270" r:id="rId21"/>
-    <p:sldId id="286" r:id="rId22"/>
+    <p:sldId id="287" r:id="rId8"/>
+    <p:sldId id="274" r:id="rId9"/>
+    <p:sldId id="288" r:id="rId10"/>
+    <p:sldId id="272" r:id="rId11"/>
+    <p:sldId id="275" r:id="rId12"/>
+    <p:sldId id="276" r:id="rId13"/>
+    <p:sldId id="277" r:id="rId14"/>
+    <p:sldId id="278" r:id="rId15"/>
+    <p:sldId id="279" r:id="rId16"/>
+    <p:sldId id="280" r:id="rId17"/>
+    <p:sldId id="281" r:id="rId18"/>
+    <p:sldId id="282" r:id="rId19"/>
+    <p:sldId id="283" r:id="rId20"/>
+    <p:sldId id="284" r:id="rId21"/>
+    <p:sldId id="285" r:id="rId22"/>
+    <p:sldId id="270" r:id="rId23"/>
+    <p:sldId id="286" r:id="rId24"/>
   </p:sldIdLst>
   <p:sldSz cx="9144000" cy="6858000" type="screen4x3"/>
   <p:notesSz cx="6858000" cy="9144000"/>
@@ -5302,7 +5304,7 @@
       </p:grpSpPr>
       <p:sp>
         <p:nvSpPr>
-          <p:cNvPr id="2" name="Titel 1"/>
+          <p:cNvPr id="2" name="Title 1"/>
           <p:cNvSpPr>
             <a:spLocks noGrp="1"/>
           </p:cNvSpPr>
@@ -5315,7 +5317,15 @@
           <a:bodyPr/>
           <a:lstStyle/>
           <a:p>
-            <a:endParaRPr lang="de-DE" dirty="0"/>
+            <a:r>
+              <a:rPr lang="en-US" dirty="0" err="1" smtClean="0"/>
+              <a:t>Architektur</a:t>
+            </a:r>
+            <a:r>
+              <a:rPr lang="en-US" dirty="0" smtClean="0"/>
+              <a:t>: Interfaces</a:t>
+            </a:r>
+            <a:endParaRPr lang="en-US" dirty="0"/>
           </a:p>
         </p:txBody>
       </p:sp>
@@ -5327,8 +5337,8 @@
         </p:nvSpPr>
         <p:spPr>
           <a:xfrm>
-            <a:off x="457200" y="3143250"/>
-            <a:ext cx="8378190" cy="769441"/>
+            <a:off x="3867447" y="2898421"/>
+            <a:ext cx="4564117" cy="646331"/>
           </a:xfrm>
           <a:prstGeom prst="rect">
             <a:avLst/>
@@ -5341,19 +5351,169 @@
           </a:bodyPr>
           <a:lstStyle/>
           <a:p>
-            <a:pPr algn="ctr"/>
-            <a:r>
-              <a:rPr lang="en-US" sz="4400" dirty="0" err="1" smtClean="0"/>
-              <a:t>Besonderheiten</a:t>
-            </a:r>
-            <a:endParaRPr lang="en-US" sz="4400" dirty="0"/>
-          </a:p>
-        </p:txBody>
-      </p:sp>
+            <a:r>
+              <a:rPr lang="en-US" b="1" dirty="0" err="1" smtClean="0"/>
+              <a:t>Unabhängig</a:t>
+            </a:r>
+            <a:r>
+              <a:rPr lang="en-US" dirty="0" smtClean="0"/>
+              <a:t> von </a:t>
+            </a:r>
+            <a:r>
+              <a:rPr lang="en-US" dirty="0" err="1" smtClean="0"/>
+              <a:t>plattformspezifischen</a:t>
+            </a:r>
+            <a:r>
+              <a:rPr lang="en-US" dirty="0" smtClean="0"/>
+              <a:t> </a:t>
+            </a:r>
+            <a:r>
+              <a:rPr lang="en-US" dirty="0" smtClean="0"/>
+              <a:t>Audio-Frameworks</a:t>
+            </a:r>
+            <a:endParaRPr lang="en-US" dirty="0" smtClean="0"/>
+          </a:p>
+        </p:txBody>
+      </p:sp>
+      <p:sp>
+        <p:nvSpPr>
+          <p:cNvPr id="13" name="TextBox 12"/>
+          <p:cNvSpPr txBox="1"/>
+          <p:nvPr/>
+        </p:nvSpPr>
+        <p:spPr>
+          <a:xfrm>
+            <a:off x="3867446" y="4846535"/>
+            <a:ext cx="4564117" cy="646331"/>
+          </a:xfrm>
+          <a:prstGeom prst="rect">
+            <a:avLst/>
+          </a:prstGeom>
+          <a:noFill/>
+        </p:spPr>
+        <p:txBody>
+          <a:bodyPr wrap="square" rtlCol="0">
+            <a:spAutoFit/>
+          </a:bodyPr>
+          <a:lstStyle/>
+          <a:p>
+            <a:r>
+              <a:rPr lang="en-US" b="1" dirty="0" err="1" smtClean="0"/>
+              <a:t>Abstraktion</a:t>
+            </a:r>
+            <a:r>
+              <a:rPr lang="en-US" dirty="0" smtClean="0"/>
+              <a:t> von der </a:t>
+            </a:r>
+            <a:r>
+              <a:rPr lang="en-US" dirty="0" err="1" smtClean="0"/>
+              <a:t>konkreten</a:t>
+            </a:r>
+            <a:r>
+              <a:rPr lang="en-US" dirty="0" smtClean="0"/>
+              <a:t> </a:t>
+            </a:r>
+            <a:r>
+              <a:rPr lang="en-US" dirty="0" err="1" smtClean="0"/>
+              <a:t>Speicherimplementierung</a:t>
+            </a:r>
+            <a:endParaRPr lang="en-US" dirty="0" smtClean="0"/>
+          </a:p>
+        </p:txBody>
+      </p:sp>
+      <p:pic>
+        <p:nvPicPr>
+          <p:cNvPr id="5" name="Content Placeholder 4"/>
+          <p:cNvPicPr>
+            <a:picLocks noGrp="1" noChangeAspect="1"/>
+          </p:cNvPicPr>
+          <p:nvPr>
+            <p:ph idx="1"/>
+          </p:nvPr>
+        </p:nvPicPr>
+        <p:blipFill>
+          <a:blip r:embed="rId2">
+            <a:extLst>
+              <a:ext uri="{28A0092B-C50C-407E-A947-70E740481C1C}">
+                <a14:useLocalDpi xmlns:a14="http://schemas.microsoft.com/office/drawing/2010/main" val="0"/>
+              </a:ext>
+            </a:extLst>
+          </a:blip>
+          <a:stretch>
+            <a:fillRect/>
+          </a:stretch>
+        </p:blipFill>
+        <p:spPr>
+          <a:xfrm>
+            <a:off x="457200" y="2060188"/>
+            <a:ext cx="2877836" cy="913233"/>
+          </a:xfrm>
+        </p:spPr>
+      </p:pic>
+      <p:pic>
+        <p:nvPicPr>
+          <p:cNvPr id="6" name="Picture 5"/>
+          <p:cNvPicPr>
+            <a:picLocks noChangeAspect="1"/>
+          </p:cNvPicPr>
+          <p:nvPr/>
+        </p:nvPicPr>
+        <p:blipFill>
+          <a:blip r:embed="rId3">
+            <a:extLst>
+              <a:ext uri="{28A0092B-C50C-407E-A947-70E740481C1C}">
+                <a14:useLocalDpi xmlns:a14="http://schemas.microsoft.com/office/drawing/2010/main" val="0"/>
+              </a:ext>
+            </a:extLst>
+          </a:blip>
+          <a:stretch>
+            <a:fillRect/>
+          </a:stretch>
+        </p:blipFill>
+        <p:spPr>
+          <a:xfrm>
+            <a:off x="457200" y="3355128"/>
+            <a:ext cx="2902332" cy="920101"/>
+          </a:xfrm>
+          <a:prstGeom prst="rect">
+            <a:avLst/>
+          </a:prstGeom>
+        </p:spPr>
+      </p:pic>
+      <p:pic>
+        <p:nvPicPr>
+          <p:cNvPr id="7" name="Picture 6"/>
+          <p:cNvPicPr>
+            <a:picLocks noChangeAspect="1"/>
+          </p:cNvPicPr>
+          <p:nvPr/>
+        </p:nvPicPr>
+        <p:blipFill>
+          <a:blip r:embed="rId4">
+            <a:extLst>
+              <a:ext uri="{28A0092B-C50C-407E-A947-70E740481C1C}">
+                <a14:useLocalDpi xmlns:a14="http://schemas.microsoft.com/office/drawing/2010/main" val="0"/>
+              </a:ext>
+            </a:extLst>
+          </a:blip>
+          <a:stretch>
+            <a:fillRect/>
+          </a:stretch>
+        </p:blipFill>
+        <p:spPr>
+          <a:xfrm>
+            <a:off x="457200" y="4708842"/>
+            <a:ext cx="2902332" cy="921718"/>
+          </a:xfrm>
+          <a:prstGeom prst="rect">
+            <a:avLst/>
+          </a:prstGeom>
+        </p:spPr>
+      </p:pic>
     </p:spTree>
     <p:extLst>
       <p:ext uri="{BB962C8B-B14F-4D97-AF65-F5344CB8AC3E}">
-        <p14:creationId xmlns:p14="http://schemas.microsoft.com/office/powerpoint/2010/main" val="1331332653"/>
+        <p14:creationId xmlns:p14="http://schemas.microsoft.com/office/powerpoint/2010/main" val="1828560639"/>
       </p:ext>
     </p:extLst>
   </p:cSld>
@@ -5404,6 +5564,669 @@
           <a:p>
             <a:r>
               <a:rPr lang="en-US" dirty="0" err="1" smtClean="0"/>
+              <a:t>Architektur</a:t>
+            </a:r>
+            <a:r>
+              <a:rPr lang="en-US" dirty="0" smtClean="0"/>
+              <a:t>: Proxy Pattern</a:t>
+            </a:r>
+            <a:endParaRPr lang="en-US" dirty="0"/>
+          </a:p>
+        </p:txBody>
+      </p:sp>
+      <p:sp>
+        <p:nvSpPr>
+          <p:cNvPr id="10" name="TextBox 9"/>
+          <p:cNvSpPr txBox="1"/>
+          <p:nvPr/>
+        </p:nvSpPr>
+        <p:spPr>
+          <a:xfrm>
+            <a:off x="2068393" y="4684139"/>
+            <a:ext cx="5125827" cy="923330"/>
+          </a:xfrm>
+          <a:prstGeom prst="rect">
+            <a:avLst/>
+          </a:prstGeom>
+          <a:noFill/>
+        </p:spPr>
+        <p:txBody>
+          <a:bodyPr wrap="none" rtlCol="0">
+            <a:spAutoFit/>
+          </a:bodyPr>
+          <a:lstStyle/>
+          <a:p>
+            <a:pPr algn="ctr"/>
+            <a:r>
+              <a:rPr lang="en-US" b="1" dirty="0" err="1" smtClean="0"/>
+              <a:t>PageProxy</a:t>
+            </a:r>
+            <a:r>
+              <a:rPr lang="en-US" b="1" dirty="0" smtClean="0"/>
+              <a:t> </a:t>
+            </a:r>
+            <a:r>
+              <a:rPr lang="en-US" b="1" dirty="0" err="1" smtClean="0"/>
+              <a:t>lädt</a:t>
+            </a:r>
+            <a:r>
+              <a:rPr lang="en-US" b="1" dirty="0" smtClean="0"/>
+              <a:t> </a:t>
+            </a:r>
+            <a:r>
+              <a:rPr lang="en-US" b="1" dirty="0" err="1" smtClean="0"/>
+              <a:t>Metadaten</a:t>
+            </a:r>
+            <a:r>
+              <a:rPr lang="en-US" b="1" dirty="0" smtClean="0"/>
+              <a:t> </a:t>
+            </a:r>
+            <a:r>
+              <a:rPr lang="en-US" dirty="0" err="1" smtClean="0"/>
+              <a:t>ohne</a:t>
+            </a:r>
+            <a:r>
+              <a:rPr lang="en-US" dirty="0" smtClean="0"/>
+              <a:t> </a:t>
+            </a:r>
+            <a:r>
+              <a:rPr lang="en-US" dirty="0" err="1" smtClean="0"/>
+              <a:t>zusätzlichen</a:t>
+            </a:r>
+            <a:r>
+              <a:rPr lang="en-US" dirty="0" smtClean="0"/>
+              <a:t> Traffic.</a:t>
+            </a:r>
+          </a:p>
+          <a:p>
+            <a:pPr algn="ctr"/>
+            <a:endParaRPr lang="en-US" dirty="0"/>
+          </a:p>
+          <a:p>
+            <a:pPr algn="ctr"/>
+            <a:r>
+              <a:rPr lang="en-US" dirty="0" err="1" smtClean="0"/>
+              <a:t>Audiodateien</a:t>
+            </a:r>
+            <a:r>
+              <a:rPr lang="en-US" dirty="0" smtClean="0"/>
+              <a:t> </a:t>
+            </a:r>
+            <a:r>
+              <a:rPr lang="en-US" dirty="0" err="1" smtClean="0"/>
+              <a:t>werden</a:t>
+            </a:r>
+            <a:r>
+              <a:rPr lang="en-US" dirty="0" smtClean="0"/>
+              <a:t> </a:t>
+            </a:r>
+            <a:r>
+              <a:rPr lang="en-US" dirty="0" err="1" smtClean="0"/>
+              <a:t>nur</a:t>
+            </a:r>
+            <a:r>
+              <a:rPr lang="en-US" dirty="0" smtClean="0"/>
+              <a:t> </a:t>
+            </a:r>
+            <a:r>
+              <a:rPr lang="en-US" b="1" dirty="0" err="1" smtClean="0"/>
+              <a:t>bei</a:t>
+            </a:r>
+            <a:r>
+              <a:rPr lang="en-US" b="1" dirty="0" smtClean="0"/>
+              <a:t> </a:t>
+            </a:r>
+            <a:r>
+              <a:rPr lang="en-US" b="1" dirty="0" err="1" smtClean="0"/>
+              <a:t>Bedarf</a:t>
+            </a:r>
+            <a:r>
+              <a:rPr lang="en-US" b="1" dirty="0" smtClean="0"/>
+              <a:t> </a:t>
+            </a:r>
+            <a:r>
+              <a:rPr lang="en-US" b="1" dirty="0" err="1" smtClean="0"/>
+              <a:t>geladen</a:t>
+            </a:r>
+            <a:r>
+              <a:rPr lang="en-US" b="1" dirty="0" smtClean="0"/>
+              <a:t>.</a:t>
+            </a:r>
+            <a:endParaRPr lang="en-US" b="1" dirty="0"/>
+          </a:p>
+        </p:txBody>
+      </p:sp>
+      <p:pic>
+        <p:nvPicPr>
+          <p:cNvPr id="8" name="Picture 7"/>
+          <p:cNvPicPr>
+            <a:picLocks noChangeAspect="1"/>
+          </p:cNvPicPr>
+          <p:nvPr/>
+        </p:nvPicPr>
+        <p:blipFill>
+          <a:blip r:embed="rId2">
+            <a:extLst>
+              <a:ext uri="{28A0092B-C50C-407E-A947-70E740481C1C}">
+                <a14:useLocalDpi xmlns:a14="http://schemas.microsoft.com/office/drawing/2010/main" val="0"/>
+              </a:ext>
+            </a:extLst>
+          </a:blip>
+          <a:stretch>
+            <a:fillRect/>
+          </a:stretch>
+        </p:blipFill>
+        <p:spPr>
+          <a:xfrm>
+            <a:off x="0" y="1750234"/>
+            <a:ext cx="2316476" cy="2316476"/>
+          </a:xfrm>
+          <a:prstGeom prst="rect">
+            <a:avLst/>
+          </a:prstGeom>
+        </p:spPr>
+      </p:pic>
+      <p:sp>
+        <p:nvSpPr>
+          <p:cNvPr id="4" name="Rectangle 3"/>
+          <p:cNvSpPr/>
+          <p:nvPr/>
+        </p:nvSpPr>
+        <p:spPr>
+          <a:xfrm>
+            <a:off x="2115381" y="2363062"/>
+            <a:ext cx="1648512" cy="1113860"/>
+          </a:xfrm>
+          <a:prstGeom prst="rect">
+            <a:avLst/>
+          </a:prstGeom>
+        </p:spPr>
+        <p:style>
+          <a:lnRef idx="2">
+            <a:schemeClr val="accent6"/>
+          </a:lnRef>
+          <a:fillRef idx="1">
+            <a:schemeClr val="lt1"/>
+          </a:fillRef>
+          <a:effectRef idx="0">
+            <a:schemeClr val="accent6"/>
+          </a:effectRef>
+          <a:fontRef idx="minor">
+            <a:schemeClr val="dk1"/>
+          </a:fontRef>
+        </p:style>
+        <p:txBody>
+          <a:bodyPr rtlCol="0" anchor="ctr"/>
+          <a:lstStyle/>
+          <a:p>
+            <a:pPr algn="ctr"/>
+            <a:endParaRPr lang="en-US"/>
+          </a:p>
+        </p:txBody>
+      </p:sp>
+      <p:sp>
+        <p:nvSpPr>
+          <p:cNvPr id="9" name="TextBox 8"/>
+          <p:cNvSpPr txBox="1"/>
+          <p:nvPr/>
+        </p:nvSpPr>
+        <p:spPr>
+          <a:xfrm>
+            <a:off x="2230998" y="2708417"/>
+            <a:ext cx="1417277" cy="400110"/>
+          </a:xfrm>
+          <a:prstGeom prst="rect">
+            <a:avLst/>
+          </a:prstGeom>
+          <a:noFill/>
+        </p:spPr>
+        <p:txBody>
+          <a:bodyPr wrap="square" rtlCol="0">
+            <a:spAutoFit/>
+          </a:bodyPr>
+          <a:lstStyle/>
+          <a:p>
+            <a:pPr algn="ctr"/>
+            <a:r>
+              <a:rPr lang="en-US" sz="2000" b="1" dirty="0" err="1" smtClean="0"/>
+              <a:t>PageProxy</a:t>
+            </a:r>
+            <a:endParaRPr lang="en-US" sz="2000" b="1" dirty="0"/>
+          </a:p>
+        </p:txBody>
+      </p:sp>
+      <p:pic>
+        <p:nvPicPr>
+          <p:cNvPr id="11" name="Picture 10"/>
+          <p:cNvPicPr>
+            <a:picLocks noChangeAspect="1"/>
+          </p:cNvPicPr>
+          <p:nvPr/>
+        </p:nvPicPr>
+        <p:blipFill>
+          <a:blip r:embed="rId3">
+            <a:extLst>
+              <a:ext uri="{28A0092B-C50C-407E-A947-70E740481C1C}">
+                <a14:useLocalDpi xmlns:a14="http://schemas.microsoft.com/office/drawing/2010/main" val="0"/>
+              </a:ext>
+            </a:extLst>
+          </a:blip>
+          <a:stretch>
+            <a:fillRect/>
+          </a:stretch>
+        </p:blipFill>
+        <p:spPr>
+          <a:xfrm>
+            <a:off x="6673182" y="2286355"/>
+            <a:ext cx="1487712" cy="1485900"/>
+          </a:xfrm>
+          <a:prstGeom prst="rect">
+            <a:avLst/>
+          </a:prstGeom>
+        </p:spPr>
+      </p:pic>
+      <p:pic>
+        <p:nvPicPr>
+          <p:cNvPr id="13" name="Picture 12"/>
+          <p:cNvPicPr>
+            <a:picLocks noChangeAspect="1"/>
+          </p:cNvPicPr>
+          <p:nvPr/>
+        </p:nvPicPr>
+        <p:blipFill>
+          <a:blip r:embed="rId4">
+            <a:extLst>
+              <a:ext uri="{28A0092B-C50C-407E-A947-70E740481C1C}">
+                <a14:useLocalDpi xmlns:a14="http://schemas.microsoft.com/office/drawing/2010/main" val="0"/>
+              </a:ext>
+            </a:extLst>
+          </a:blip>
+          <a:stretch>
+            <a:fillRect/>
+          </a:stretch>
+        </p:blipFill>
+        <p:spPr>
+          <a:xfrm>
+            <a:off x="8328048" y="2431250"/>
+            <a:ext cx="710077" cy="946769"/>
+          </a:xfrm>
+          <a:prstGeom prst="rect">
+            <a:avLst/>
+          </a:prstGeom>
+        </p:spPr>
+      </p:pic>
+      <p:sp>
+        <p:nvSpPr>
+          <p:cNvPr id="14" name="TextBox 13"/>
+          <p:cNvSpPr txBox="1"/>
+          <p:nvPr/>
+        </p:nvSpPr>
+        <p:spPr>
+          <a:xfrm>
+            <a:off x="6378381" y="1560994"/>
+            <a:ext cx="1972603" cy="646331"/>
+          </a:xfrm>
+          <a:prstGeom prst="rect">
+            <a:avLst/>
+          </a:prstGeom>
+        </p:spPr>
+        <p:style>
+          <a:lnRef idx="2">
+            <a:schemeClr val="accent2"/>
+          </a:lnRef>
+          <a:fillRef idx="1">
+            <a:schemeClr val="lt1"/>
+          </a:fillRef>
+          <a:effectRef idx="0">
+            <a:schemeClr val="accent2"/>
+          </a:effectRef>
+          <a:fontRef idx="minor">
+            <a:schemeClr val="dk1"/>
+          </a:fontRef>
+        </p:style>
+        <p:txBody>
+          <a:bodyPr wrap="square" rtlCol="0">
+            <a:spAutoFit/>
+          </a:bodyPr>
+          <a:lstStyle/>
+          <a:p>
+            <a:pPr algn="ctr"/>
+            <a:r>
+              <a:rPr lang="en-US" dirty="0" err="1" smtClean="0">
+                <a:latin typeface="Courier" charset="0"/>
+                <a:ea typeface="Courier" charset="0"/>
+                <a:cs typeface="Courier" charset="0"/>
+              </a:rPr>
+              <a:t>Seitenzahl</a:t>
+            </a:r>
+            <a:r>
+              <a:rPr lang="en-US" dirty="0" smtClean="0">
+                <a:latin typeface="Courier" charset="0"/>
+                <a:ea typeface="Courier" charset="0"/>
+                <a:cs typeface="Courier" charset="0"/>
+              </a:rPr>
+              <a:t>: 5</a:t>
+            </a:r>
+            <a:br>
+              <a:rPr lang="en-US" dirty="0" smtClean="0">
+                <a:latin typeface="Courier" charset="0"/>
+                <a:ea typeface="Courier" charset="0"/>
+                <a:cs typeface="Courier" charset="0"/>
+              </a:rPr>
+            </a:br>
+            <a:r>
+              <a:rPr lang="en-US" dirty="0" err="1" smtClean="0">
+                <a:latin typeface="Courier" charset="0"/>
+                <a:ea typeface="Courier" charset="0"/>
+                <a:cs typeface="Courier" charset="0"/>
+              </a:rPr>
+              <a:t>Untertitel</a:t>
+            </a:r>
+            <a:r>
+              <a:rPr lang="en-US" dirty="0" smtClean="0">
+                <a:latin typeface="Courier" charset="0"/>
+                <a:ea typeface="Courier" charset="0"/>
+                <a:cs typeface="Courier" charset="0"/>
+              </a:rPr>
+              <a:t>: </a:t>
+            </a:r>
+            <a:r>
+              <a:rPr lang="is-IS" dirty="0" smtClean="0">
+                <a:latin typeface="Courier" charset="0"/>
+                <a:ea typeface="Courier" charset="0"/>
+                <a:cs typeface="Courier" charset="0"/>
+              </a:rPr>
+              <a:t>…</a:t>
+            </a:r>
+            <a:endParaRPr lang="en-US" dirty="0">
+              <a:latin typeface="Courier" charset="0"/>
+              <a:ea typeface="Courier" charset="0"/>
+              <a:cs typeface="Courier" charset="0"/>
+            </a:endParaRPr>
+          </a:p>
+        </p:txBody>
+      </p:sp>
+      <p:cxnSp>
+        <p:nvCxnSpPr>
+          <p:cNvPr id="16" name="Straight Arrow Connector 15"/>
+          <p:cNvCxnSpPr/>
+          <p:nvPr/>
+        </p:nvCxnSpPr>
+        <p:spPr>
+          <a:xfrm flipV="1">
+            <a:off x="3888606" y="2908472"/>
+            <a:ext cx="2594486" cy="11520"/>
+          </a:xfrm>
+          <a:prstGeom prst="straightConnector1">
+            <a:avLst/>
+          </a:prstGeom>
+          <a:ln>
+            <a:headEnd type="triangle"/>
+            <a:tailEnd type="triangle"/>
+          </a:ln>
+        </p:spPr>
+        <p:style>
+          <a:lnRef idx="1">
+            <a:schemeClr val="accent1"/>
+          </a:lnRef>
+          <a:fillRef idx="0">
+            <a:schemeClr val="accent1"/>
+          </a:fillRef>
+          <a:effectRef idx="0">
+            <a:schemeClr val="accent1"/>
+          </a:effectRef>
+          <a:fontRef idx="minor">
+            <a:schemeClr val="tx1"/>
+          </a:fontRef>
+        </p:style>
+      </p:cxnSp>
+    </p:spTree>
+    <p:extLst>
+      <p:ext uri="{BB962C8B-B14F-4D97-AF65-F5344CB8AC3E}">
+        <p14:creationId xmlns:p14="http://schemas.microsoft.com/office/powerpoint/2010/main" val="1395683405"/>
+      </p:ext>
+    </p:extLst>
+  </p:cSld>
+  <p:clrMapOvr>
+    <a:masterClrMapping/>
+  </p:clrMapOvr>
+  <p:timing>
+    <p:tnLst>
+      <p:par>
+        <p:cTn id="1" dur="indefinite" restart="never" nodeType="tmRoot">
+          <p:childTnLst>
+            <p:seq concurrent="1" nextAc="seek">
+              <p:cTn id="2" dur="indefinite" nodeType="mainSeq">
+                <p:childTnLst>
+                  <p:par>
+                    <p:cTn id="3" fill="hold">
+                      <p:stCondLst>
+                        <p:cond delay="indefinite"/>
+                      </p:stCondLst>
+                      <p:childTnLst>
+                        <p:par>
+                          <p:cTn id="4" fill="hold">
+                            <p:stCondLst>
+                              <p:cond delay="0"/>
+                            </p:stCondLst>
+                            <p:childTnLst>
+                              <p:par>
+                                <p:cTn id="5" presetID="37" presetClass="path" presetSubtype="0" accel="50000" decel="50000" fill="hold" grpId="0" nodeType="clickEffect">
+                                  <p:stCondLst>
+                                    <p:cond delay="0"/>
+                                  </p:stCondLst>
+                                  <p:childTnLst>
+                                    <p:animMotion origin="layout" path="M -1.94444E-6 0.00416 L -0.12951 -0.07917 C -0.1566 -0.09792 -0.19705 -0.10764 -0.23941 -0.10764 C -0.2875 -0.10764 -0.32604 -0.09792 -0.35312 -0.07917 L -0.48229 0.00416 " pathEditMode="relative" rAng="0" ptsTypes="AAAAA">
+                                      <p:cBhvr>
+                                        <p:cTn id="6" dur="2000" fill="hold"/>
+                                        <p:tgtEl>
+                                          <p:spTgt spid="14"/>
+                                        </p:tgtEl>
+                                        <p:attrNameLst>
+                                          <p:attrName>ppt_x</p:attrName>
+                                          <p:attrName>ppt_y</p:attrName>
+                                        </p:attrNameLst>
+                                      </p:cBhvr>
+                                      <p:rCtr x="-24115" y="-5602"/>
+                                    </p:animMotion>
+                                  </p:childTnLst>
+                                </p:cTn>
+                              </p:par>
+                            </p:childTnLst>
+                          </p:cTn>
+                        </p:par>
+                      </p:childTnLst>
+                    </p:cTn>
+                  </p:par>
+                  <p:par>
+                    <p:cTn id="7" fill="hold">
+                      <p:stCondLst>
+                        <p:cond delay="indefinite"/>
+                      </p:stCondLst>
+                      <p:childTnLst>
+                        <p:par>
+                          <p:cTn id="8" fill="hold">
+                            <p:stCondLst>
+                              <p:cond delay="0"/>
+                            </p:stCondLst>
+                            <p:childTnLst>
+                              <p:par>
+                                <p:cTn id="9" presetID="37" presetClass="path" presetSubtype="0" accel="50000" decel="50000" fill="hold" nodeType="clickEffect">
+                                  <p:stCondLst>
+                                    <p:cond delay="0"/>
+                                  </p:stCondLst>
+                                  <p:childTnLst>
+                                    <p:animMotion origin="layout" path="M 8.33333E-7 3.7037E-7 L -0.22049 0.08611 C -0.26667 0.10556 -0.33542 0.1162 -0.40729 0.1162 C -0.48958 0.1162 -0.55504 0.10556 -0.60122 0.08611 L -0.82101 3.7037E-7 " pathEditMode="relative" rAng="0" ptsTypes="AAAAA">
+                                      <p:cBhvr>
+                                        <p:cTn id="10" dur="2000" fill="hold"/>
+                                        <p:tgtEl>
+                                          <p:spTgt spid="13"/>
+                                        </p:tgtEl>
+                                        <p:attrNameLst>
+                                          <p:attrName>ppt_x</p:attrName>
+                                          <p:attrName>ppt_y</p:attrName>
+                                        </p:attrNameLst>
+                                      </p:cBhvr>
+                                      <p:rCtr x="-41059" y="5810"/>
+                                    </p:animMotion>
+                                  </p:childTnLst>
+                                </p:cTn>
+                              </p:par>
+                            </p:childTnLst>
+                          </p:cTn>
+                        </p:par>
+                      </p:childTnLst>
+                    </p:cTn>
+                  </p:par>
+                </p:childTnLst>
+              </p:cTn>
+              <p:prevCondLst>
+                <p:cond evt="onPrev" delay="0">
+                  <p:tgtEl>
+                    <p:sldTgt/>
+                  </p:tgtEl>
+                </p:cond>
+              </p:prevCondLst>
+              <p:nextCondLst>
+                <p:cond evt="onNext" delay="0">
+                  <p:tgtEl>
+                    <p:sldTgt/>
+                  </p:tgtEl>
+                </p:cond>
+              </p:nextCondLst>
+            </p:seq>
+          </p:childTnLst>
+        </p:cTn>
+      </p:par>
+    </p:tnLst>
+    <p:bldLst>
+      <p:bldP spid="14" grpId="0" animBg="1"/>
+    </p:bldLst>
+  </p:timing>
+</p:sld>
+</file>
+
+<file path=ppt/slides/slide12.xml><?xml version="1.0" encoding="utf-8"?>
+<p:sld xmlns:a="http://schemas.openxmlformats.org/drawingml/2006/main" xmlns:r="http://schemas.openxmlformats.org/officeDocument/2006/relationships" xmlns:p="http://schemas.openxmlformats.org/presentationml/2006/main">
+  <p:cSld>
+    <p:spTree>
+      <p:nvGrpSpPr>
+        <p:cNvPr id="1" name=""/>
+        <p:cNvGrpSpPr/>
+        <p:nvPr/>
+      </p:nvGrpSpPr>
+      <p:grpSpPr>
+        <a:xfrm>
+          <a:off x="0" y="0"/>
+          <a:ext cx="0" cy="0"/>
+          <a:chOff x="0" y="0"/>
+          <a:chExt cx="0" cy="0"/>
+        </a:xfrm>
+      </p:grpSpPr>
+      <p:sp>
+        <p:nvSpPr>
+          <p:cNvPr id="2" name="Titel 1"/>
+          <p:cNvSpPr>
+            <a:spLocks noGrp="1"/>
+          </p:cNvSpPr>
+          <p:nvPr>
+            <p:ph type="title"/>
+          </p:nvPr>
+        </p:nvSpPr>
+        <p:spPr/>
+        <p:txBody>
+          <a:bodyPr/>
+          <a:lstStyle/>
+          <a:p>
+            <a:endParaRPr lang="de-DE" dirty="0"/>
+          </a:p>
+        </p:txBody>
+      </p:sp>
+      <p:sp>
+        <p:nvSpPr>
+          <p:cNvPr id="3" name="TextBox 2"/>
+          <p:cNvSpPr txBox="1"/>
+          <p:nvPr/>
+        </p:nvSpPr>
+        <p:spPr>
+          <a:xfrm>
+            <a:off x="457200" y="3143250"/>
+            <a:ext cx="8378190" cy="769441"/>
+          </a:xfrm>
+          <a:prstGeom prst="rect">
+            <a:avLst/>
+          </a:prstGeom>
+          <a:noFill/>
+        </p:spPr>
+        <p:txBody>
+          <a:bodyPr wrap="square" rtlCol="0">
+            <a:spAutoFit/>
+          </a:bodyPr>
+          <a:lstStyle/>
+          <a:p>
+            <a:pPr algn="ctr"/>
+            <a:r>
+              <a:rPr lang="en-US" sz="4400" dirty="0" err="1" smtClean="0"/>
+              <a:t>Besonderheiten</a:t>
+            </a:r>
+            <a:endParaRPr lang="en-US" sz="4400" dirty="0"/>
+          </a:p>
+        </p:txBody>
+      </p:sp>
+    </p:spTree>
+    <p:extLst>
+      <p:ext uri="{BB962C8B-B14F-4D97-AF65-F5344CB8AC3E}">
+        <p14:creationId xmlns:p14="http://schemas.microsoft.com/office/powerpoint/2010/main" val="1331332653"/>
+      </p:ext>
+    </p:extLst>
+  </p:cSld>
+  <p:clrMapOvr>
+    <a:masterClrMapping/>
+  </p:clrMapOvr>
+  <p:timing>
+    <p:tnLst>
+      <p:par>
+        <p:cTn id="1" dur="indefinite" restart="never" nodeType="tmRoot"/>
+      </p:par>
+    </p:tnLst>
+  </p:timing>
+</p:sld>
+</file>
+
+<file path=ppt/slides/slide13.xml><?xml version="1.0" encoding="utf-8"?>
+<p:sld xmlns:a="http://schemas.openxmlformats.org/drawingml/2006/main" xmlns:r="http://schemas.openxmlformats.org/officeDocument/2006/relationships" xmlns:p="http://schemas.openxmlformats.org/presentationml/2006/main">
+  <p:cSld>
+    <p:spTree>
+      <p:nvGrpSpPr>
+        <p:cNvPr id="1" name=""/>
+        <p:cNvGrpSpPr/>
+        <p:nvPr/>
+      </p:nvGrpSpPr>
+      <p:grpSpPr>
+        <a:xfrm>
+          <a:off x="0" y="0"/>
+          <a:ext cx="0" cy="0"/>
+          <a:chOff x="0" y="0"/>
+          <a:chExt cx="0" cy="0"/>
+        </a:xfrm>
+      </p:grpSpPr>
+      <p:sp>
+        <p:nvSpPr>
+          <p:cNvPr id="2" name="Title 1"/>
+          <p:cNvSpPr>
+            <a:spLocks noGrp="1"/>
+          </p:cNvSpPr>
+          <p:nvPr>
+            <p:ph type="title"/>
+          </p:nvPr>
+        </p:nvSpPr>
+        <p:spPr/>
+        <p:txBody>
+          <a:bodyPr/>
+          <a:lstStyle/>
+          <a:p>
+            <a:r>
+              <a:rPr lang="en-US" dirty="0" err="1" smtClean="0"/>
               <a:t>Besonderheiten</a:t>
             </a:r>
             <a:r>
@@ -5682,7 +6505,7 @@
 </p:sld>
 </file>
 
-<file path=ppt/slides/slide12.xml><?xml version="1.0" encoding="utf-8"?>
+<file path=ppt/slides/slide14.xml><?xml version="1.0" encoding="utf-8"?>
 <p:sld xmlns:a="http://schemas.openxmlformats.org/drawingml/2006/main" xmlns:r="http://schemas.openxmlformats.org/officeDocument/2006/relationships" xmlns:p="http://schemas.openxmlformats.org/presentationml/2006/main">
   <p:cSld>
     <p:spTree>
@@ -5880,7 +6703,7 @@
 </p:sld>
 </file>
 
-<file path=ppt/slides/slide13.xml><?xml version="1.0" encoding="utf-8"?>
+<file path=ppt/slides/slide15.xml><?xml version="1.0" encoding="utf-8"?>
 <p:sld xmlns:a="http://schemas.openxmlformats.org/drawingml/2006/main" xmlns:r="http://schemas.openxmlformats.org/officeDocument/2006/relationships" xmlns:p="http://schemas.openxmlformats.org/presentationml/2006/main">
   <p:cSld>
     <p:spTree>
@@ -6112,180 +6935,6 @@
     <p:extLst>
       <p:ext uri="{BB962C8B-B14F-4D97-AF65-F5344CB8AC3E}">
         <p14:creationId xmlns:p14="http://schemas.microsoft.com/office/powerpoint/2010/main" val="913264240"/>
-      </p:ext>
-    </p:extLst>
-  </p:cSld>
-  <p:clrMapOvr>
-    <a:masterClrMapping/>
-  </p:clrMapOvr>
-  <p:timing>
-    <p:tnLst>
-      <p:par>
-        <p:cTn id="1" dur="indefinite" restart="never" nodeType="tmRoot"/>
-      </p:par>
-    </p:tnLst>
-  </p:timing>
-</p:sld>
-</file>
-
-<file path=ppt/slides/slide14.xml><?xml version="1.0" encoding="utf-8"?>
-<p:sld xmlns:a="http://schemas.openxmlformats.org/drawingml/2006/main" xmlns:r="http://schemas.openxmlformats.org/officeDocument/2006/relationships" xmlns:p="http://schemas.openxmlformats.org/presentationml/2006/main">
-  <p:cSld>
-    <p:spTree>
-      <p:nvGrpSpPr>
-        <p:cNvPr id="1" name=""/>
-        <p:cNvGrpSpPr/>
-        <p:nvPr/>
-      </p:nvGrpSpPr>
-      <p:grpSpPr>
-        <a:xfrm>
-          <a:off x="0" y="0"/>
-          <a:ext cx="0" cy="0"/>
-          <a:chOff x="0" y="0"/>
-          <a:chExt cx="0" cy="0"/>
-        </a:xfrm>
-      </p:grpSpPr>
-      <p:sp>
-        <p:nvSpPr>
-          <p:cNvPr id="2" name="Titel 1"/>
-          <p:cNvSpPr>
-            <a:spLocks noGrp="1"/>
-          </p:cNvSpPr>
-          <p:nvPr>
-            <p:ph type="title"/>
-          </p:nvPr>
-        </p:nvSpPr>
-        <p:spPr/>
-        <p:txBody>
-          <a:bodyPr/>
-          <a:lstStyle/>
-          <a:p>
-            <a:endParaRPr lang="de-DE" dirty="0"/>
-          </a:p>
-        </p:txBody>
-      </p:sp>
-      <p:sp>
-        <p:nvSpPr>
-          <p:cNvPr id="3" name="TextBox 2"/>
-          <p:cNvSpPr txBox="1"/>
-          <p:nvPr/>
-        </p:nvSpPr>
-        <p:spPr>
-          <a:xfrm>
-            <a:off x="457200" y="3143250"/>
-            <a:ext cx="8378190" cy="769441"/>
-          </a:xfrm>
-          <a:prstGeom prst="rect">
-            <a:avLst/>
-          </a:prstGeom>
-          <a:noFill/>
-        </p:spPr>
-        <p:txBody>
-          <a:bodyPr wrap="square" rtlCol="0">
-            <a:spAutoFit/>
-          </a:bodyPr>
-          <a:lstStyle/>
-          <a:p>
-            <a:pPr algn="ctr"/>
-            <a:r>
-              <a:rPr lang="en-US" sz="4400" dirty="0" smtClean="0"/>
-              <a:t>Live Demo</a:t>
-            </a:r>
-            <a:endParaRPr lang="en-US" sz="4400" dirty="0"/>
-          </a:p>
-        </p:txBody>
-      </p:sp>
-    </p:spTree>
-    <p:extLst>
-      <p:ext uri="{BB962C8B-B14F-4D97-AF65-F5344CB8AC3E}">
-        <p14:creationId xmlns:p14="http://schemas.microsoft.com/office/powerpoint/2010/main" val="675173480"/>
-      </p:ext>
-    </p:extLst>
-  </p:cSld>
-  <p:clrMapOvr>
-    <a:masterClrMapping/>
-  </p:clrMapOvr>
-  <p:timing>
-    <p:tnLst>
-      <p:par>
-        <p:cTn id="1" dur="indefinite" restart="never" nodeType="tmRoot"/>
-      </p:par>
-    </p:tnLst>
-  </p:timing>
-</p:sld>
-</file>
-
-<file path=ppt/slides/slide15.xml><?xml version="1.0" encoding="utf-8"?>
-<p:sld xmlns:a="http://schemas.openxmlformats.org/drawingml/2006/main" xmlns:r="http://schemas.openxmlformats.org/officeDocument/2006/relationships" xmlns:p="http://schemas.openxmlformats.org/presentationml/2006/main">
-  <p:cSld>
-    <p:spTree>
-      <p:nvGrpSpPr>
-        <p:cNvPr id="1" name=""/>
-        <p:cNvGrpSpPr/>
-        <p:nvPr/>
-      </p:nvGrpSpPr>
-      <p:grpSpPr>
-        <a:xfrm>
-          <a:off x="0" y="0"/>
-          <a:ext cx="0" cy="0"/>
-          <a:chOff x="0" y="0"/>
-          <a:chExt cx="0" cy="0"/>
-        </a:xfrm>
-      </p:grpSpPr>
-      <p:sp>
-        <p:nvSpPr>
-          <p:cNvPr id="2" name="Titel 1"/>
-          <p:cNvSpPr>
-            <a:spLocks noGrp="1"/>
-          </p:cNvSpPr>
-          <p:nvPr>
-            <p:ph type="title"/>
-          </p:nvPr>
-        </p:nvSpPr>
-        <p:spPr/>
-        <p:txBody>
-          <a:bodyPr/>
-          <a:lstStyle/>
-          <a:p>
-            <a:endParaRPr lang="de-DE" dirty="0"/>
-          </a:p>
-        </p:txBody>
-      </p:sp>
-      <p:sp>
-        <p:nvSpPr>
-          <p:cNvPr id="3" name="TextBox 2"/>
-          <p:cNvSpPr txBox="1"/>
-          <p:nvPr/>
-        </p:nvSpPr>
-        <p:spPr>
-          <a:xfrm>
-            <a:off x="457200" y="3143250"/>
-            <a:ext cx="8378190" cy="769441"/>
-          </a:xfrm>
-          <a:prstGeom prst="rect">
-            <a:avLst/>
-          </a:prstGeom>
-          <a:noFill/>
-        </p:spPr>
-        <p:txBody>
-          <a:bodyPr wrap="square" rtlCol="0">
-            <a:spAutoFit/>
-          </a:bodyPr>
-          <a:lstStyle/>
-          <a:p>
-            <a:pPr algn="ctr"/>
-            <a:r>
-              <a:rPr lang="en-US" sz="4400" dirty="0" smtClean="0"/>
-              <a:t>Future Work</a:t>
-            </a:r>
-            <a:endParaRPr lang="en-US" sz="4400" dirty="0"/>
-          </a:p>
-        </p:txBody>
-      </p:sp>
-    </p:spTree>
-    <p:extLst>
-      <p:ext uri="{BB962C8B-B14F-4D97-AF65-F5344CB8AC3E}">
-        <p14:creationId xmlns:p14="http://schemas.microsoft.com/office/powerpoint/2010/main" val="369634098"/>
       </p:ext>
     </p:extLst>
   </p:cSld>
@@ -6321,7 +6970,7 @@
       </p:grpSpPr>
       <p:sp>
         <p:nvSpPr>
-          <p:cNvPr id="2" name="Title 1"/>
+          <p:cNvPr id="2" name="Titel 1"/>
           <p:cNvSpPr>
             <a:spLocks noGrp="1"/>
           </p:cNvSpPr>
@@ -6334,133 +6983,45 @@
           <a:bodyPr/>
           <a:lstStyle/>
           <a:p>
-            <a:r>
-              <a:rPr lang="en-US" dirty="0" smtClean="0"/>
-              <a:t>Future Work</a:t>
-            </a:r>
-            <a:endParaRPr lang="en-US" dirty="0"/>
-          </a:p>
-        </p:txBody>
-      </p:sp>
-      <p:sp>
-        <p:nvSpPr>
-          <p:cNvPr id="3" name="Content Placeholder 2"/>
-          <p:cNvSpPr>
-            <a:spLocks noGrp="1"/>
-          </p:cNvSpPr>
-          <p:nvPr>
-            <p:ph idx="1"/>
-          </p:nvPr>
+            <a:endParaRPr lang="de-DE" dirty="0"/>
+          </a:p>
+        </p:txBody>
+      </p:sp>
+      <p:sp>
+        <p:nvSpPr>
+          <p:cNvPr id="3" name="TextBox 2"/>
+          <p:cNvSpPr txBox="1"/>
+          <p:nvPr/>
         </p:nvSpPr>
         <p:spPr>
           <a:xfrm>
-            <a:off x="457200" y="2569778"/>
-            <a:ext cx="8229600" cy="3716741"/>
-          </a:xfrm>
-        </p:spPr>
-        <p:txBody>
-          <a:bodyPr>
-            <a:normAutofit/>
+            <a:off x="457200" y="3143250"/>
+            <a:ext cx="8378190" cy="769441"/>
+          </a:xfrm>
+          <a:prstGeom prst="rect">
+            <a:avLst/>
+          </a:prstGeom>
+          <a:noFill/>
+        </p:spPr>
+        <p:txBody>
+          <a:bodyPr wrap="square" rtlCol="0">
+            <a:spAutoFit/>
           </a:bodyPr>
           <a:lstStyle/>
           <a:p>
             <a:pPr algn="ctr"/>
-            <a:endParaRPr lang="en-US" sz="2400" dirty="0" smtClean="0"/>
-          </a:p>
-          <a:p>
-            <a:pPr algn="ctr"/>
-            <a:r>
-              <a:rPr lang="en-US" sz="2400" dirty="0" err="1" smtClean="0"/>
-              <a:t>Externe</a:t>
-            </a:r>
-            <a:r>
-              <a:rPr lang="en-US" sz="2400" dirty="0" smtClean="0"/>
-              <a:t> Audio-</a:t>
-            </a:r>
-            <a:r>
-              <a:rPr lang="en-US" sz="2400" dirty="0" err="1" smtClean="0"/>
-              <a:t>Bibliotheken</a:t>
-            </a:r>
-            <a:r>
-              <a:rPr lang="en-US" sz="2400" dirty="0" smtClean="0"/>
-              <a:t> </a:t>
-            </a:r>
-            <a:r>
-              <a:rPr lang="en-US" sz="2400" dirty="0" err="1" smtClean="0"/>
-              <a:t>für</a:t>
-            </a:r>
-            <a:r>
-              <a:rPr lang="en-US" sz="2400" dirty="0" smtClean="0"/>
-              <a:t> </a:t>
-            </a:r>
-            <a:r>
-              <a:rPr lang="en-US" sz="2400" dirty="0" err="1" smtClean="0"/>
-              <a:t>bessere</a:t>
-            </a:r>
-            <a:r>
-              <a:rPr lang="en-US" sz="2400" dirty="0" smtClean="0"/>
-              <a:t> </a:t>
-            </a:r>
-            <a:r>
-              <a:rPr lang="en-US" sz="2400" dirty="0" err="1" smtClean="0"/>
-              <a:t>Qualität</a:t>
-            </a:r>
-            <a:endParaRPr lang="en-US" sz="2400" dirty="0" smtClean="0"/>
-          </a:p>
-          <a:p>
-            <a:pPr algn="ctr"/>
-            <a:r>
-              <a:rPr lang="en-US" sz="2400" dirty="0" err="1" smtClean="0"/>
-              <a:t>Statistiken</a:t>
-            </a:r>
-            <a:r>
-              <a:rPr lang="en-US" sz="2400" dirty="0" smtClean="0"/>
-              <a:t> </a:t>
-            </a:r>
-            <a:r>
-              <a:rPr lang="en-US" sz="2400" dirty="0" err="1" smtClean="0"/>
-              <a:t>über</a:t>
-            </a:r>
-            <a:r>
-              <a:rPr lang="en-US" sz="2400" dirty="0" smtClean="0"/>
-              <a:t> </a:t>
-            </a:r>
-            <a:r>
-              <a:rPr lang="en-US" sz="2400" dirty="0" err="1" smtClean="0"/>
-              <a:t>Nutzung</a:t>
-            </a:r>
-            <a:r>
-              <a:rPr lang="en-US" sz="2400" dirty="0" smtClean="0"/>
-              <a:t> und </a:t>
-            </a:r>
-            <a:r>
-              <a:rPr lang="en-US" sz="2400" dirty="0" err="1" smtClean="0"/>
-              <a:t>Fortschritt</a:t>
-            </a:r>
-            <a:endParaRPr lang="en-US" sz="2400" dirty="0" smtClean="0"/>
-          </a:p>
-          <a:p>
-            <a:pPr algn="ctr"/>
-            <a:r>
-              <a:rPr lang="en-US" sz="2400" dirty="0" err="1" smtClean="0"/>
-              <a:t>Unterscheidung</a:t>
-            </a:r>
-            <a:r>
-              <a:rPr lang="en-US" sz="2400" dirty="0" smtClean="0"/>
-              <a:t> der </a:t>
-            </a:r>
-            <a:r>
-              <a:rPr lang="en-US" sz="2400" dirty="0" err="1" smtClean="0"/>
-              <a:t>Aufgabentypen</a:t>
-            </a:r>
-            <a:endParaRPr lang="en-US" sz="2400" dirty="0"/>
+            <a:r>
+              <a:rPr lang="en-US" sz="4400" dirty="0" smtClean="0"/>
+              <a:t>Live Demo</a:t>
+            </a:r>
+            <a:endParaRPr lang="en-US" sz="4400" dirty="0"/>
           </a:p>
         </p:txBody>
       </p:sp>
     </p:spTree>
     <p:extLst>
       <p:ext uri="{BB962C8B-B14F-4D97-AF65-F5344CB8AC3E}">
-        <p14:creationId xmlns:p14="http://schemas.microsoft.com/office/powerpoint/2010/main" val="709960535"/>
+        <p14:creationId xmlns:p14="http://schemas.microsoft.com/office/powerpoint/2010/main" val="675173480"/>
       </p:ext>
     </p:extLst>
   </p:cSld>
@@ -6522,7 +7083,7 @@
         <p:spPr>
           <a:xfrm>
             <a:off x="457200" y="3143250"/>
-            <a:ext cx="8378190" cy="1446550"/>
+            <a:ext cx="8378190" cy="769441"/>
           </a:xfrm>
           <a:prstGeom prst="rect">
             <a:avLst/>
@@ -6538,31 +7099,7 @@
             <a:pPr algn="ctr"/>
             <a:r>
               <a:rPr lang="en-US" sz="4400" dirty="0" err="1" smtClean="0"/>
-              <a:t>Vielen</a:t>
-            </a:r>
-            <a:r>
-              <a:rPr lang="en-US" sz="4400" dirty="0" smtClean="0"/>
-              <a:t> Dank </a:t>
-            </a:r>
-            <a:r>
-              <a:rPr lang="en-US" sz="4400" dirty="0" err="1" smtClean="0"/>
-              <a:t>für</a:t>
-            </a:r>
-            <a:r>
-              <a:rPr lang="en-US" sz="4400" dirty="0" smtClean="0"/>
-              <a:t> </a:t>
-            </a:r>
-            <a:r>
-              <a:rPr lang="en-US" sz="4400" dirty="0" err="1" smtClean="0"/>
-              <a:t>Ihre</a:t>
-            </a:r>
-            <a:r>
-              <a:rPr lang="en-US" sz="4400" dirty="0" smtClean="0"/>
-              <a:t> </a:t>
-            </a:r>
-            <a:r>
-              <a:rPr lang="en-US" sz="4400" dirty="0" err="1" smtClean="0"/>
-              <a:t>Aufmerksamkeit</a:t>
+              <a:t>Ausblick</a:t>
             </a:r>
             <a:endParaRPr lang="en-US" sz="4400" dirty="0"/>
           </a:p>
@@ -6571,7 +7108,7 @@
     </p:spTree>
     <p:extLst>
       <p:ext uri="{BB962C8B-B14F-4D97-AF65-F5344CB8AC3E}">
-        <p14:creationId xmlns:p14="http://schemas.microsoft.com/office/powerpoint/2010/main" val="942215261"/>
+        <p14:creationId xmlns:p14="http://schemas.microsoft.com/office/powerpoint/2010/main" val="369634098"/>
       </p:ext>
     </p:extLst>
   </p:cSld>
@@ -6591,14 +7128,6 @@
 <file path=ppt/slides/slide18.xml><?xml version="1.0" encoding="utf-8"?>
 <p:sld xmlns:a="http://schemas.openxmlformats.org/drawingml/2006/main" xmlns:r="http://schemas.openxmlformats.org/officeDocument/2006/relationships" xmlns:p="http://schemas.openxmlformats.org/presentationml/2006/main">
   <p:cSld>
-    <p:bg>
-      <p:bgPr>
-        <a:solidFill>
-          <a:schemeClr val="tx1"/>
-        </a:solidFill>
-        <a:effectLst/>
-      </p:bgPr>
-    </p:bg>
     <p:spTree>
       <p:nvGrpSpPr>
         <p:cNvPr id="1" name=""/>
@@ -6613,40 +7142,148 @@
           <a:chExt cx="0" cy="0"/>
         </a:xfrm>
       </p:grpSpPr>
-      <p:pic>
-        <p:nvPicPr>
-          <p:cNvPr id="4" name="Picture 3"/>
-          <p:cNvPicPr>
-            <a:picLocks noChangeAspect="1"/>
-          </p:cNvPicPr>
-          <p:nvPr/>
-        </p:nvPicPr>
-        <p:blipFill>
-          <a:blip r:embed="rId2">
-            <a:extLst>
-              <a:ext uri="{28A0092B-C50C-407E-A947-70E740481C1C}">
-                <a14:useLocalDpi xmlns:a14="http://schemas.microsoft.com/office/drawing/2010/main" val="0"/>
-              </a:ext>
-            </a:extLst>
-          </a:blip>
-          <a:stretch>
-            <a:fillRect/>
-          </a:stretch>
-        </p:blipFill>
+      <p:sp>
+        <p:nvSpPr>
+          <p:cNvPr id="2" name="Title 1"/>
+          <p:cNvSpPr>
+            <a:spLocks noGrp="1"/>
+          </p:cNvSpPr>
+          <p:nvPr>
+            <p:ph type="title"/>
+          </p:nvPr>
+        </p:nvSpPr>
+        <p:spPr/>
+        <p:txBody>
+          <a:bodyPr/>
+          <a:lstStyle/>
+          <a:p>
+            <a:r>
+              <a:rPr lang="en-US" dirty="0" err="1" smtClean="0"/>
+              <a:t>Ausblick</a:t>
+            </a:r>
+            <a:endParaRPr lang="en-US" dirty="0"/>
+          </a:p>
+        </p:txBody>
+      </p:sp>
+      <p:sp>
+        <p:nvSpPr>
+          <p:cNvPr id="3" name="Content Placeholder 2"/>
+          <p:cNvSpPr>
+            <a:spLocks noGrp="1"/>
+          </p:cNvSpPr>
+          <p:nvPr>
+            <p:ph idx="1"/>
+          </p:nvPr>
+        </p:nvSpPr>
         <p:spPr>
           <a:xfrm>
-            <a:off x="197507" y="5511800"/>
-            <a:ext cx="2603500" cy="1346200"/>
-          </a:xfrm>
-          <a:prstGeom prst="rect">
-            <a:avLst/>
-          </a:prstGeom>
-        </p:spPr>
-      </p:pic>
+            <a:off x="457200" y="2569778"/>
+            <a:ext cx="8229600" cy="3716741"/>
+          </a:xfrm>
+        </p:spPr>
+        <p:txBody>
+          <a:bodyPr>
+            <a:normAutofit/>
+          </a:bodyPr>
+          <a:lstStyle/>
+          <a:p>
+            <a:pPr algn="ctr"/>
+            <a:endParaRPr lang="en-US" sz="2400" dirty="0" smtClean="0"/>
+          </a:p>
+          <a:p>
+            <a:pPr algn="ctr"/>
+            <a:r>
+              <a:rPr lang="en-US" sz="2400" dirty="0" err="1" smtClean="0"/>
+              <a:t>Externe</a:t>
+            </a:r>
+            <a:r>
+              <a:rPr lang="en-US" sz="2400" dirty="0" smtClean="0"/>
+              <a:t> Audio-</a:t>
+            </a:r>
+            <a:r>
+              <a:rPr lang="en-US" sz="2400" dirty="0" err="1" smtClean="0"/>
+              <a:t>Bibliotheken</a:t>
+            </a:r>
+            <a:r>
+              <a:rPr lang="en-US" sz="2400" dirty="0" smtClean="0"/>
+              <a:t> </a:t>
+            </a:r>
+            <a:r>
+              <a:rPr lang="en-US" sz="2400" dirty="0" err="1" smtClean="0"/>
+              <a:t>für</a:t>
+            </a:r>
+            <a:r>
+              <a:rPr lang="en-US" sz="2400" dirty="0" smtClean="0"/>
+              <a:t> </a:t>
+            </a:r>
+            <a:r>
+              <a:rPr lang="en-US" sz="2400" dirty="0" err="1" smtClean="0"/>
+              <a:t>bessere</a:t>
+            </a:r>
+            <a:r>
+              <a:rPr lang="en-US" sz="2400" dirty="0" smtClean="0"/>
+              <a:t> </a:t>
+            </a:r>
+            <a:r>
+              <a:rPr lang="en-US" sz="2400" dirty="0" err="1" smtClean="0"/>
+              <a:t>Qualität</a:t>
+            </a:r>
+            <a:endParaRPr lang="en-US" sz="2400" dirty="0" smtClean="0"/>
+          </a:p>
+          <a:p>
+            <a:pPr algn="ctr"/>
+            <a:r>
+              <a:rPr lang="en-US" sz="2400" dirty="0" err="1" smtClean="0"/>
+              <a:t>Statistiken</a:t>
+            </a:r>
+            <a:r>
+              <a:rPr lang="en-US" sz="2400" dirty="0" smtClean="0"/>
+              <a:t> </a:t>
+            </a:r>
+            <a:r>
+              <a:rPr lang="en-US" sz="2400" dirty="0" err="1" smtClean="0"/>
+              <a:t>über</a:t>
+            </a:r>
+            <a:r>
+              <a:rPr lang="en-US" sz="2400" dirty="0" smtClean="0"/>
+              <a:t> </a:t>
+            </a:r>
+            <a:r>
+              <a:rPr lang="en-US" sz="2400" dirty="0" err="1" smtClean="0"/>
+              <a:t>Nutzung</a:t>
+            </a:r>
+            <a:r>
+              <a:rPr lang="en-US" sz="2400" dirty="0" smtClean="0"/>
+              <a:t> und </a:t>
+            </a:r>
+            <a:r>
+              <a:rPr lang="en-US" sz="2400" dirty="0" err="1" smtClean="0"/>
+              <a:t>Fortschritt</a:t>
+            </a:r>
+            <a:endParaRPr lang="en-US" sz="2400" dirty="0" smtClean="0"/>
+          </a:p>
+          <a:p>
+            <a:pPr algn="ctr"/>
+            <a:r>
+              <a:rPr lang="en-US" sz="2400" dirty="0" err="1" smtClean="0"/>
+              <a:t>Unterscheidung</a:t>
+            </a:r>
+            <a:r>
+              <a:rPr lang="en-US" sz="2400" dirty="0" smtClean="0"/>
+              <a:t> der </a:t>
+            </a:r>
+            <a:r>
+              <a:rPr lang="en-US" sz="2400" dirty="0" err="1" smtClean="0"/>
+              <a:t>Aufgabentypen</a:t>
+            </a:r>
+            <a:endParaRPr lang="en-US" sz="2400" dirty="0"/>
+          </a:p>
+        </p:txBody>
+      </p:sp>
     </p:spTree>
     <p:extLst>
       <p:ext uri="{BB962C8B-B14F-4D97-AF65-F5344CB8AC3E}">
-        <p14:creationId xmlns:p14="http://schemas.microsoft.com/office/powerpoint/2010/main" val="1296881111"/>
+        <p14:creationId xmlns:p14="http://schemas.microsoft.com/office/powerpoint/2010/main" val="709960535"/>
       </p:ext>
     </p:extLst>
   </p:cSld>
@@ -6682,7 +7319,7 @@
       </p:grpSpPr>
       <p:sp>
         <p:nvSpPr>
-          <p:cNvPr id="2" name="Title 1"/>
+          <p:cNvPr id="2" name="Titel 1"/>
           <p:cNvSpPr>
             <a:spLocks noGrp="1"/>
           </p:cNvSpPr>
@@ -6695,55 +7332,69 @@
           <a:bodyPr/>
           <a:lstStyle/>
           <a:p>
-            <a:r>
-              <a:rPr lang="en-US" dirty="0" err="1" smtClean="0"/>
-              <a:t>Architektur</a:t>
-            </a:r>
-            <a:r>
-              <a:rPr lang="en-US" dirty="0" smtClean="0"/>
-              <a:t>: </a:t>
-            </a:r>
-            <a:r>
-              <a:rPr lang="en-US" dirty="0" err="1" smtClean="0"/>
-              <a:t>Domänenmodell</a:t>
-            </a:r>
-            <a:endParaRPr lang="en-US" dirty="0"/>
-          </a:p>
-        </p:txBody>
-      </p:sp>
-      <p:pic>
-        <p:nvPicPr>
-          <p:cNvPr id="8" name="Content Placeholder 7"/>
-          <p:cNvPicPr>
-            <a:picLocks noGrp="1" noChangeAspect="1"/>
-          </p:cNvPicPr>
-          <p:nvPr>
-            <p:ph idx="1"/>
-          </p:nvPr>
-        </p:nvPicPr>
-        <p:blipFill>
-          <a:blip r:embed="rId2">
-            <a:extLst>
-              <a:ext uri="{28A0092B-C50C-407E-A947-70E740481C1C}">
-                <a14:useLocalDpi xmlns:a14="http://schemas.microsoft.com/office/drawing/2010/main" val="0"/>
-              </a:ext>
-            </a:extLst>
-          </a:blip>
-          <a:stretch>
-            <a:fillRect/>
-          </a:stretch>
-        </p:blipFill>
+            <a:endParaRPr lang="de-DE" dirty="0"/>
+          </a:p>
+        </p:txBody>
+      </p:sp>
+      <p:sp>
+        <p:nvSpPr>
+          <p:cNvPr id="3" name="TextBox 2"/>
+          <p:cNvSpPr txBox="1"/>
+          <p:nvPr/>
+        </p:nvSpPr>
         <p:spPr>
           <a:xfrm>
-            <a:off x="457199" y="2531078"/>
-            <a:ext cx="8918895" cy="2875312"/>
-          </a:xfrm>
-        </p:spPr>
-      </p:pic>
+            <a:off x="457200" y="3143250"/>
+            <a:ext cx="8378190" cy="1446550"/>
+          </a:xfrm>
+          <a:prstGeom prst="rect">
+            <a:avLst/>
+          </a:prstGeom>
+          <a:noFill/>
+        </p:spPr>
+        <p:txBody>
+          <a:bodyPr wrap="square" rtlCol="0">
+            <a:spAutoFit/>
+          </a:bodyPr>
+          <a:lstStyle/>
+          <a:p>
+            <a:pPr algn="ctr"/>
+            <a:r>
+              <a:rPr lang="en-US" sz="4400" dirty="0" err="1" smtClean="0"/>
+              <a:t>Vielen</a:t>
+            </a:r>
+            <a:r>
+              <a:rPr lang="en-US" sz="4400" dirty="0" smtClean="0"/>
+              <a:t> Dank </a:t>
+            </a:r>
+            <a:r>
+              <a:rPr lang="en-US" sz="4400" dirty="0" err="1" smtClean="0"/>
+              <a:t>für</a:t>
+            </a:r>
+            <a:r>
+              <a:rPr lang="en-US" sz="4400" dirty="0" smtClean="0"/>
+              <a:t> </a:t>
+            </a:r>
+            <a:r>
+              <a:rPr lang="en-US" sz="4400" dirty="0" err="1" smtClean="0"/>
+              <a:t>Ihre</a:t>
+            </a:r>
+            <a:r>
+              <a:rPr lang="en-US" sz="4400" dirty="0" smtClean="0"/>
+              <a:t> </a:t>
+            </a:r>
+            <a:r>
+              <a:rPr lang="en-US" sz="4400" dirty="0" err="1" smtClean="0"/>
+              <a:t>Aufmerksamkeit</a:t>
+            </a:r>
+            <a:endParaRPr lang="en-US" sz="4400" dirty="0"/>
+          </a:p>
+        </p:txBody>
+      </p:sp>
     </p:spTree>
     <p:extLst>
       <p:ext uri="{BB962C8B-B14F-4D97-AF65-F5344CB8AC3E}">
-        <p14:creationId xmlns:p14="http://schemas.microsoft.com/office/powerpoint/2010/main" val="913848531"/>
+        <p14:creationId xmlns:p14="http://schemas.microsoft.com/office/powerpoint/2010/main" val="942215261"/>
       </p:ext>
     </p:extLst>
   </p:cSld>
@@ -6990,6 +7641,178 @@
 <file path=ppt/slides/slide20.xml><?xml version="1.0" encoding="utf-8"?>
 <p:sld xmlns:a="http://schemas.openxmlformats.org/drawingml/2006/main" xmlns:r="http://schemas.openxmlformats.org/officeDocument/2006/relationships" xmlns:p="http://schemas.openxmlformats.org/presentationml/2006/main">
   <p:cSld>
+    <p:bg>
+      <p:bgPr>
+        <a:solidFill>
+          <a:schemeClr val="tx1"/>
+        </a:solidFill>
+        <a:effectLst/>
+      </p:bgPr>
+    </p:bg>
+    <p:spTree>
+      <p:nvGrpSpPr>
+        <p:cNvPr id="1" name=""/>
+        <p:cNvGrpSpPr/>
+        <p:nvPr/>
+      </p:nvGrpSpPr>
+      <p:grpSpPr>
+        <a:xfrm>
+          <a:off x="0" y="0"/>
+          <a:ext cx="0" cy="0"/>
+          <a:chOff x="0" y="0"/>
+          <a:chExt cx="0" cy="0"/>
+        </a:xfrm>
+      </p:grpSpPr>
+      <p:pic>
+        <p:nvPicPr>
+          <p:cNvPr id="4" name="Picture 3"/>
+          <p:cNvPicPr>
+            <a:picLocks noChangeAspect="1"/>
+          </p:cNvPicPr>
+          <p:nvPr/>
+        </p:nvPicPr>
+        <p:blipFill>
+          <a:blip r:embed="rId2">
+            <a:extLst>
+              <a:ext uri="{28A0092B-C50C-407E-A947-70E740481C1C}">
+                <a14:useLocalDpi xmlns:a14="http://schemas.microsoft.com/office/drawing/2010/main" val="0"/>
+              </a:ext>
+            </a:extLst>
+          </a:blip>
+          <a:stretch>
+            <a:fillRect/>
+          </a:stretch>
+        </p:blipFill>
+        <p:spPr>
+          <a:xfrm>
+            <a:off x="197507" y="5511800"/>
+            <a:ext cx="2603500" cy="1346200"/>
+          </a:xfrm>
+          <a:prstGeom prst="rect">
+            <a:avLst/>
+          </a:prstGeom>
+        </p:spPr>
+      </p:pic>
+    </p:spTree>
+    <p:extLst>
+      <p:ext uri="{BB962C8B-B14F-4D97-AF65-F5344CB8AC3E}">
+        <p14:creationId xmlns:p14="http://schemas.microsoft.com/office/powerpoint/2010/main" val="1296881111"/>
+      </p:ext>
+    </p:extLst>
+  </p:cSld>
+  <p:clrMapOvr>
+    <a:masterClrMapping/>
+  </p:clrMapOvr>
+  <p:timing>
+    <p:tnLst>
+      <p:par>
+        <p:cTn id="1" dur="indefinite" restart="never" nodeType="tmRoot"/>
+      </p:par>
+    </p:tnLst>
+  </p:timing>
+</p:sld>
+</file>
+
+<file path=ppt/slides/slide21.xml><?xml version="1.0" encoding="utf-8"?>
+<p:sld xmlns:a="http://schemas.openxmlformats.org/drawingml/2006/main" xmlns:r="http://schemas.openxmlformats.org/officeDocument/2006/relationships" xmlns:p="http://schemas.openxmlformats.org/presentationml/2006/main">
+  <p:cSld>
+    <p:spTree>
+      <p:nvGrpSpPr>
+        <p:cNvPr id="1" name=""/>
+        <p:cNvGrpSpPr/>
+        <p:nvPr/>
+      </p:nvGrpSpPr>
+      <p:grpSpPr>
+        <a:xfrm>
+          <a:off x="0" y="0"/>
+          <a:ext cx="0" cy="0"/>
+          <a:chOff x="0" y="0"/>
+          <a:chExt cx="0" cy="0"/>
+        </a:xfrm>
+      </p:grpSpPr>
+      <p:sp>
+        <p:nvSpPr>
+          <p:cNvPr id="2" name="Title 1"/>
+          <p:cNvSpPr>
+            <a:spLocks noGrp="1"/>
+          </p:cNvSpPr>
+          <p:nvPr>
+            <p:ph type="title"/>
+          </p:nvPr>
+        </p:nvSpPr>
+        <p:spPr/>
+        <p:txBody>
+          <a:bodyPr/>
+          <a:lstStyle/>
+          <a:p>
+            <a:r>
+              <a:rPr lang="en-US" dirty="0" err="1" smtClean="0"/>
+              <a:t>Architektur</a:t>
+            </a:r>
+            <a:r>
+              <a:rPr lang="en-US" dirty="0" smtClean="0"/>
+              <a:t>: </a:t>
+            </a:r>
+            <a:r>
+              <a:rPr lang="en-US" dirty="0" err="1" smtClean="0"/>
+              <a:t>Domänenmodell</a:t>
+            </a:r>
+            <a:endParaRPr lang="en-US" dirty="0"/>
+          </a:p>
+        </p:txBody>
+      </p:sp>
+      <p:pic>
+        <p:nvPicPr>
+          <p:cNvPr id="8" name="Content Placeholder 7"/>
+          <p:cNvPicPr>
+            <a:picLocks noGrp="1" noChangeAspect="1"/>
+          </p:cNvPicPr>
+          <p:nvPr>
+            <p:ph idx="1"/>
+          </p:nvPr>
+        </p:nvPicPr>
+        <p:blipFill>
+          <a:blip r:embed="rId2">
+            <a:extLst>
+              <a:ext uri="{28A0092B-C50C-407E-A947-70E740481C1C}">
+                <a14:useLocalDpi xmlns:a14="http://schemas.microsoft.com/office/drawing/2010/main" val="0"/>
+              </a:ext>
+            </a:extLst>
+          </a:blip>
+          <a:stretch>
+            <a:fillRect/>
+          </a:stretch>
+        </p:blipFill>
+        <p:spPr>
+          <a:xfrm>
+            <a:off x="457199" y="2531078"/>
+            <a:ext cx="8918895" cy="2875312"/>
+          </a:xfrm>
+        </p:spPr>
+      </p:pic>
+    </p:spTree>
+    <p:extLst>
+      <p:ext uri="{BB962C8B-B14F-4D97-AF65-F5344CB8AC3E}">
+        <p14:creationId xmlns:p14="http://schemas.microsoft.com/office/powerpoint/2010/main" val="913848531"/>
+      </p:ext>
+    </p:extLst>
+  </p:cSld>
+  <p:clrMapOvr>
+    <a:masterClrMapping/>
+  </p:clrMapOvr>
+  <p:timing>
+    <p:tnLst>
+      <p:par>
+        <p:cTn id="1" dur="indefinite" restart="never" nodeType="tmRoot"/>
+      </p:par>
+    </p:tnLst>
+  </p:timing>
+</p:sld>
+</file>
+
+<file path=ppt/slides/slide22.xml><?xml version="1.0" encoding="utf-8"?>
+<p:sld xmlns:a="http://schemas.openxmlformats.org/drawingml/2006/main" xmlns:r="http://schemas.openxmlformats.org/officeDocument/2006/relationships" xmlns:p="http://schemas.openxmlformats.org/presentationml/2006/main">
+  <p:cSld>
     <p:spTree>
       <p:nvGrpSpPr>
         <p:cNvPr id="1" name=""/>
@@ -7564,7 +8387,7 @@
         </p:blipFill>
         <p:spPr>
           <a:xfrm>
-            <a:off x="675402" y="2366440"/>
+            <a:off x="415527" y="2366440"/>
             <a:ext cx="668553" cy="594855"/>
           </a:xfrm>
           <a:prstGeom prst="rect">
@@ -8245,6 +9068,33 @@
           <a:chExt cx="0" cy="0"/>
         </a:xfrm>
       </p:grpSpPr>
+      <p:sp>
+        <p:nvSpPr>
+          <p:cNvPr id="2" name="Title 1"/>
+          <p:cNvSpPr>
+            <a:spLocks noGrp="1"/>
+          </p:cNvSpPr>
+          <p:nvPr>
+            <p:ph type="title"/>
+          </p:nvPr>
+        </p:nvSpPr>
+        <p:spPr/>
+        <p:txBody>
+          <a:bodyPr/>
+          <a:lstStyle/>
+          <a:p>
+            <a:r>
+              <a:rPr lang="en-US" dirty="0" err="1" smtClean="0"/>
+              <a:t>Architektur</a:t>
+            </a:r>
+            <a:r>
+              <a:rPr lang="en-US" dirty="0" smtClean="0"/>
+              <a:t> Backend: Model-View-Controller</a:t>
+            </a:r>
+            <a:endParaRPr lang="en-US" dirty="0"/>
+          </a:p>
+        </p:txBody>
+      </p:sp>
       <p:pic>
         <p:nvPicPr>
           <p:cNvPr id="4" name="Content Placeholder 3"/>
@@ -8255,7 +9105,7 @@
             <p:ph idx="1"/>
           </p:nvPr>
         </p:nvPicPr>
-        <p:blipFill rotWithShape="1">
+        <p:blipFill>
           <a:blip r:embed="rId2">
             <a:extLst>
               <a:ext uri="{28A0092B-C50C-407E-A947-70E740481C1C}">
@@ -8263,188 +9113,21 @@
               </a:ext>
             </a:extLst>
           </a:blip>
-          <a:srcRect r="-768"/>
-          <a:stretch/>
+          <a:stretch>
+            <a:fillRect/>
+          </a:stretch>
         </p:blipFill>
         <p:spPr>
           <a:xfrm>
-            <a:off x="1402233" y="1607384"/>
-            <a:ext cx="6665208" cy="3302875"/>
-          </a:xfrm>
-          <a:prstGeom prst="rect">
-            <a:avLst/>
-          </a:prstGeom>
-          <a:solidFill>
-            <a:srgbClr val="FFFFFF">
-              <a:shade val="85000"/>
-            </a:srgbClr>
-          </a:solidFill>
-          <a:ln w="190500" cap="rnd">
-            <a:solidFill>
-              <a:srgbClr val="FFFFFF"/>
-            </a:solidFill>
-          </a:ln>
-          <a:effectLst>
-            <a:outerShdw blurRad="50000" algn="tl" rotWithShape="0">
-              <a:srgbClr val="000000">
-                <a:alpha val="41000"/>
-              </a:srgbClr>
-            </a:outerShdw>
-          </a:effectLst>
-          <a:scene3d>
-            <a:camera prst="orthographicFront"/>
-            <a:lightRig rig="twoPt" dir="t">
-              <a:rot lat="0" lon="0" rev="7800000"/>
-            </a:lightRig>
-          </a:scene3d>
-          <a:sp3d contourW="6350">
-            <a:bevelT w="50800" h="16510"/>
-            <a:contourClr>
-              <a:srgbClr val="C0C0C0"/>
-            </a:contourClr>
-          </a:sp3d>
+            <a:off x="774833" y="1245870"/>
+            <a:ext cx="7283152" cy="5098335"/>
+          </a:xfrm>
         </p:spPr>
       </p:pic>
-      <p:sp>
-        <p:nvSpPr>
-          <p:cNvPr id="2" name="Title 1"/>
-          <p:cNvSpPr>
-            <a:spLocks noGrp="1"/>
-          </p:cNvSpPr>
-          <p:nvPr>
-            <p:ph type="title"/>
-          </p:nvPr>
-        </p:nvSpPr>
-        <p:spPr/>
-        <p:txBody>
-          <a:bodyPr/>
-          <a:lstStyle/>
-          <a:p>
-            <a:r>
-              <a:rPr lang="en-US" dirty="0" err="1" smtClean="0"/>
-              <a:t>Architektur</a:t>
-            </a:r>
-            <a:r>
-              <a:rPr lang="en-US" dirty="0" smtClean="0"/>
-              <a:t>: Use-Case-Controller</a:t>
-            </a:r>
-            <a:endParaRPr lang="en-US" dirty="0"/>
-          </a:p>
-        </p:txBody>
-      </p:sp>
-      <p:sp>
-        <p:nvSpPr>
-          <p:cNvPr id="3" name="TextBox 2"/>
-          <p:cNvSpPr txBox="1"/>
-          <p:nvPr/>
-        </p:nvSpPr>
-        <p:spPr>
-          <a:xfrm>
-            <a:off x="1584434" y="5060731"/>
-            <a:ext cx="6574222" cy="677108"/>
-          </a:xfrm>
-          <a:prstGeom prst="rect">
-            <a:avLst/>
-          </a:prstGeom>
-          <a:noFill/>
-        </p:spPr>
-        <p:txBody>
-          <a:bodyPr wrap="square" rtlCol="0">
-            <a:spAutoFit/>
-          </a:bodyPr>
-          <a:lstStyle/>
-          <a:p>
-            <a:r>
-              <a:rPr lang="en-US" sz="2000" dirty="0" err="1" smtClean="0"/>
-              <a:t>Zwei</a:t>
-            </a:r>
-            <a:r>
-              <a:rPr lang="en-US" sz="2000" dirty="0" smtClean="0"/>
-              <a:t> </a:t>
-            </a:r>
-            <a:r>
-              <a:rPr lang="en-US" sz="2000" dirty="0" err="1" smtClean="0"/>
-              <a:t>Haupt</a:t>
-            </a:r>
-            <a:r>
-              <a:rPr lang="en-US" sz="2000" dirty="0" smtClean="0"/>
-              <a:t>-Use-Cases</a:t>
-            </a:r>
-            <a:r>
-              <a:rPr lang="en-US" dirty="0" smtClean="0"/>
-              <a:t>		</a:t>
-            </a:r>
-            <a:r>
-              <a:rPr lang="en-US" sz="2000" dirty="0" err="1"/>
-              <a:t>Zwei</a:t>
-            </a:r>
-            <a:r>
-              <a:rPr lang="en-US" sz="2000" dirty="0"/>
-              <a:t> </a:t>
-            </a:r>
-            <a:r>
-              <a:rPr lang="en-US" sz="2000" dirty="0" smtClean="0"/>
-              <a:t>Use-Case-Controller</a:t>
-            </a:r>
-            <a:endParaRPr lang="en-US" sz="2000" dirty="0"/>
-          </a:p>
-          <a:p>
-            <a:endParaRPr lang="en-US" dirty="0" smtClean="0"/>
-          </a:p>
-        </p:txBody>
-      </p:sp>
-      <p:sp>
-        <p:nvSpPr>
-          <p:cNvPr id="5" name="Right Arrow 4"/>
-          <p:cNvSpPr/>
-          <p:nvPr/>
-        </p:nvSpPr>
-        <p:spPr>
-          <a:xfrm>
-            <a:off x="4156651" y="5206905"/>
-            <a:ext cx="930166" cy="157655"/>
-          </a:xfrm>
-          <a:prstGeom prst="rightArrow">
-            <a:avLst/>
-          </a:prstGeom>
-          <a:solidFill>
-            <a:schemeClr val="accent2"/>
-          </a:solidFill>
-          <a:ln>
-            <a:solidFill>
-              <a:schemeClr val="bg2"/>
-            </a:solidFill>
-          </a:ln>
-        </p:spPr>
-        <p:style>
-          <a:lnRef idx="2">
-            <a:schemeClr val="accent1">
-              <a:shade val="50000"/>
-            </a:schemeClr>
-          </a:lnRef>
-          <a:fillRef idx="1">
-            <a:schemeClr val="accent1"/>
-          </a:fillRef>
-          <a:effectRef idx="0">
-            <a:schemeClr val="accent1"/>
-          </a:effectRef>
-          <a:fontRef idx="minor">
-            <a:schemeClr val="lt1"/>
-          </a:fontRef>
-        </p:style>
-        <p:txBody>
-          <a:bodyPr rtlCol="0" anchor="ctr"/>
-          <a:lstStyle/>
-          <a:p>
-            <a:pPr algn="ctr"/>
-            <a:endParaRPr lang="en-US"/>
-          </a:p>
-        </p:txBody>
-      </p:sp>
     </p:spTree>
     <p:extLst>
       <p:ext uri="{BB962C8B-B14F-4D97-AF65-F5344CB8AC3E}">
-        <p14:creationId xmlns:p14="http://schemas.microsoft.com/office/powerpoint/2010/main" val="766800706"/>
+        <p14:creationId xmlns:p14="http://schemas.microsoft.com/office/powerpoint/2010/main" val="356055087"/>
       </p:ext>
     </p:extLst>
   </p:cSld>
@@ -8499,51 +9182,26 @@
             </a:r>
             <a:r>
               <a:rPr lang="en-US" dirty="0" smtClean="0"/>
-              <a:t>: Shared Code Project</a:t>
+              <a:t> App: </a:t>
+            </a:r>
+            <a:r>
+              <a:rPr lang="en-US" dirty="0" smtClean="0"/>
+              <a:t>Use-Case-Controller</a:t>
             </a:r>
             <a:endParaRPr lang="en-US" dirty="0"/>
           </a:p>
         </p:txBody>
       </p:sp>
-      <p:pic>
-        <p:nvPicPr>
-          <p:cNvPr id="5" name="Content Placeholder 4"/>
-          <p:cNvPicPr>
-            <a:picLocks noGrp="1" noChangeAspect="1"/>
-          </p:cNvPicPr>
-          <p:nvPr>
-            <p:ph idx="1"/>
-          </p:nvPr>
-        </p:nvPicPr>
-        <p:blipFill>
-          <a:blip r:embed="rId2">
-            <a:extLst>
-              <a:ext uri="{28A0092B-C50C-407E-A947-70E740481C1C}">
-                <a14:useLocalDpi xmlns:a14="http://schemas.microsoft.com/office/drawing/2010/main" val="0"/>
-              </a:ext>
-            </a:extLst>
-          </a:blip>
-          <a:stretch>
-            <a:fillRect/>
-          </a:stretch>
-        </p:blipFill>
-        <p:spPr>
-          <a:xfrm>
-            <a:off x="819807" y="2209405"/>
-            <a:ext cx="7977352" cy="1185888"/>
-          </a:xfrm>
-        </p:spPr>
-      </p:pic>
-      <p:sp>
-        <p:nvSpPr>
-          <p:cNvPr id="8" name="TextBox 7"/>
+      <p:sp>
+        <p:nvSpPr>
+          <p:cNvPr id="3" name="TextBox 2"/>
           <p:cNvSpPr txBox="1"/>
           <p:nvPr/>
         </p:nvSpPr>
         <p:spPr>
           <a:xfrm>
-            <a:off x="3318641" y="3413234"/>
-            <a:ext cx="2979683" cy="1846659"/>
+            <a:off x="1334623" y="5026006"/>
+            <a:ext cx="6574222" cy="677108"/>
           </a:xfrm>
           <a:prstGeom prst="rect">
             <a:avLst/>
@@ -8556,64 +9214,55 @@
           </a:bodyPr>
           <a:lstStyle/>
           <a:p>
-            <a:pPr algn="ctr"/>
-            <a:r>
-              <a:rPr lang="en-US" sz="2000" b="1" dirty="0" err="1" smtClean="0"/>
-              <a:t>Gemeinsam</a:t>
-            </a:r>
-            <a:r>
-              <a:rPr lang="en-US" sz="2000" b="1" dirty="0" smtClean="0"/>
+            <a:r>
+              <a:rPr lang="en-US" sz="2000" dirty="0" err="1" smtClean="0"/>
+              <a:t>Zwei</a:t>
+            </a:r>
+            <a:r>
+              <a:rPr lang="en-US" sz="2000" dirty="0" smtClean="0"/>
               <a:t> </a:t>
             </a:r>
             <a:r>
-              <a:rPr lang="en-US" sz="2000" b="1" dirty="0" err="1" smtClean="0"/>
-              <a:t>genutzte</a:t>
-            </a:r>
-            <a:r>
-              <a:rPr lang="en-US" sz="2000" b="1" dirty="0" smtClean="0"/>
-              <a:t> Klassen</a:t>
-            </a:r>
-          </a:p>
-          <a:p>
-            <a:pPr algn="ctr"/>
-            <a:endParaRPr lang="en-US" dirty="0"/>
-          </a:p>
-          <a:p>
-            <a:pPr algn="ctr"/>
+              <a:rPr lang="en-US" sz="2000" dirty="0" err="1" smtClean="0"/>
+              <a:t>Haupt</a:t>
+            </a:r>
+            <a:r>
+              <a:rPr lang="en-US" sz="2000" dirty="0" smtClean="0"/>
+              <a:t>-Use-Cases</a:t>
+            </a:r>
+            <a:r>
+              <a:rPr lang="en-US" dirty="0" smtClean="0"/>
+              <a:t>		</a:t>
+            </a:r>
+            <a:r>
+              <a:rPr lang="en-US" sz="2000" dirty="0" err="1"/>
+              <a:t>Zwei</a:t>
+            </a:r>
+            <a:r>
+              <a:rPr lang="en-US" sz="2000" dirty="0"/>
+              <a:t> </a:t>
+            </a:r>
+            <a:r>
+              <a:rPr lang="en-US" sz="2000" dirty="0" smtClean="0"/>
+              <a:t>Use-Case-Controller</a:t>
+            </a:r>
+            <a:endParaRPr lang="en-US" sz="2000" dirty="0"/>
+          </a:p>
+          <a:p>
             <a:endParaRPr lang="en-US" dirty="0" smtClean="0"/>
           </a:p>
-          <a:p>
-            <a:pPr algn="ctr"/>
-            <a:endParaRPr lang="en-US" dirty="0" smtClean="0"/>
-          </a:p>
-          <a:p>
-            <a:pPr algn="ctr"/>
-            <a:r>
-              <a:rPr lang="en-US" sz="2000" b="1" dirty="0" err="1" smtClean="0"/>
-              <a:t>Keine</a:t>
-            </a:r>
-            <a:r>
-              <a:rPr lang="en-US" sz="2000" b="1" dirty="0" smtClean="0"/>
-              <a:t> </a:t>
-            </a:r>
-            <a:r>
-              <a:rPr lang="en-US" sz="2000" b="1" dirty="0" err="1" smtClean="0"/>
-              <a:t>Redundanz</a:t>
-            </a:r>
-            <a:endParaRPr lang="en-US" sz="2000" b="1" dirty="0"/>
-          </a:p>
-        </p:txBody>
-      </p:sp>
-      <p:sp>
-        <p:nvSpPr>
-          <p:cNvPr id="9" name="Right Arrow 8"/>
+        </p:txBody>
+      </p:sp>
+      <p:sp>
+        <p:nvSpPr>
+          <p:cNvPr id="5" name="Right Arrow 4"/>
           <p:cNvSpPr/>
           <p:nvPr/>
         </p:nvSpPr>
         <p:spPr>
-          <a:xfrm rot="5400000">
-            <a:off x="4481883" y="4288909"/>
-            <a:ext cx="653197" cy="425669"/>
+          <a:xfrm>
+            <a:off x="3993021" y="5158018"/>
+            <a:ext cx="930166" cy="157655"/>
           </a:xfrm>
           <a:prstGeom prst="rightArrow">
             <a:avLst/>
@@ -8652,10 +9301,69 @@
           </a:p>
         </p:txBody>
       </p:sp>
+      <p:pic>
+        <p:nvPicPr>
+          <p:cNvPr id="7" name="Content Placeholder 6"/>
+          <p:cNvPicPr>
+            <a:picLocks noGrp="1" noChangeAspect="1"/>
+          </p:cNvPicPr>
+          <p:nvPr>
+            <p:ph idx="1"/>
+          </p:nvPr>
+        </p:nvPicPr>
+        <p:blipFill>
+          <a:blip r:embed="rId2">
+            <a:extLst>
+              <a:ext uri="{28A0092B-C50C-407E-A947-70E740481C1C}">
+                <a14:useLocalDpi xmlns:a14="http://schemas.microsoft.com/office/drawing/2010/main" val="0"/>
+              </a:ext>
+            </a:extLst>
+          </a:blip>
+          <a:stretch>
+            <a:fillRect/>
+          </a:stretch>
+        </p:blipFill>
+        <p:spPr>
+          <a:xfrm>
+            <a:off x="1491116" y="1779482"/>
+            <a:ext cx="3816417" cy="1250937"/>
+          </a:xfrm>
+        </p:spPr>
+      </p:pic>
+      <p:pic>
+        <p:nvPicPr>
+          <p:cNvPr id="8" name="Picture 7"/>
+          <p:cNvPicPr>
+            <a:picLocks noChangeAspect="1"/>
+          </p:cNvPicPr>
+          <p:nvPr/>
+        </p:nvPicPr>
+        <p:blipFill>
+          <a:blip r:embed="rId3">
+            <a:extLst>
+              <a:ext uri="{28A0092B-C50C-407E-A947-70E740481C1C}">
+                <a14:useLocalDpi xmlns:a14="http://schemas.microsoft.com/office/drawing/2010/main" val="0"/>
+              </a:ext>
+            </a:extLst>
+          </a:blip>
+          <a:stretch>
+            <a:fillRect/>
+          </a:stretch>
+        </p:blipFill>
+        <p:spPr>
+          <a:xfrm>
+            <a:off x="3793996" y="3253198"/>
+            <a:ext cx="3946356" cy="1253747"/>
+          </a:xfrm>
+          <a:prstGeom prst="rect">
+            <a:avLst/>
+          </a:prstGeom>
+        </p:spPr>
+      </p:pic>
     </p:spTree>
     <p:extLst>
       <p:ext uri="{BB962C8B-B14F-4D97-AF65-F5344CB8AC3E}">
-        <p14:creationId xmlns:p14="http://schemas.microsoft.com/office/powerpoint/2010/main" val="646822795"/>
+        <p14:creationId xmlns:p14="http://schemas.microsoft.com/office/powerpoint/2010/main" val="766800706"/>
       </p:ext>
     </p:extLst>
   </p:cSld>
@@ -8710,89 +9418,15 @@
             </a:r>
             <a:r>
               <a:rPr lang="en-US" dirty="0" smtClean="0"/>
-              <a:t>: Interfaces</a:t>
+              <a:t> App: Model-View-Controller</a:t>
             </a:r>
             <a:endParaRPr lang="en-US" dirty="0"/>
-          </a:p>
-        </p:txBody>
-      </p:sp>
-      <p:sp>
-        <p:nvSpPr>
-          <p:cNvPr id="3" name="TextBox 2"/>
-          <p:cNvSpPr txBox="1"/>
-          <p:nvPr/>
-        </p:nvSpPr>
-        <p:spPr>
-          <a:xfrm>
-            <a:off x="4406462" y="2040938"/>
-            <a:ext cx="4564117" cy="1200329"/>
-          </a:xfrm>
-          <a:prstGeom prst="rect">
-            <a:avLst/>
-          </a:prstGeom>
-          <a:noFill/>
-        </p:spPr>
-        <p:txBody>
-          <a:bodyPr wrap="square" rtlCol="0">
-            <a:spAutoFit/>
-          </a:bodyPr>
-          <a:lstStyle/>
-          <a:p>
-            <a:r>
-              <a:rPr lang="en-US" b="1" dirty="0" err="1" smtClean="0"/>
-              <a:t>Unabhängig</a:t>
-            </a:r>
-            <a:r>
-              <a:rPr lang="en-US" dirty="0" smtClean="0"/>
-              <a:t> von </a:t>
-            </a:r>
-            <a:r>
-              <a:rPr lang="en-US" dirty="0" err="1" smtClean="0"/>
-              <a:t>plattformspezifischen</a:t>
-            </a:r>
-            <a:r>
-              <a:rPr lang="en-US" dirty="0" smtClean="0"/>
-              <a:t> Audio-Frameworks</a:t>
-            </a:r>
-          </a:p>
-          <a:p>
-            <a:endParaRPr lang="en-US" dirty="0"/>
-          </a:p>
-          <a:p>
-            <a:r>
-              <a:rPr lang="en-US" b="1" dirty="0" err="1" smtClean="0"/>
-              <a:t>Leichtes</a:t>
-            </a:r>
-            <a:r>
-              <a:rPr lang="en-US" b="1" dirty="0" smtClean="0"/>
-              <a:t> </a:t>
-            </a:r>
-            <a:r>
-              <a:rPr lang="en-US" b="1" dirty="0" err="1" smtClean="0"/>
-              <a:t>Einbinden</a:t>
-            </a:r>
-            <a:r>
-              <a:rPr lang="en-US" b="1" dirty="0" smtClean="0"/>
-              <a:t> </a:t>
-            </a:r>
-            <a:r>
-              <a:rPr lang="en-US" dirty="0" smtClean="0"/>
-              <a:t>von 3</a:t>
-            </a:r>
-            <a:r>
-              <a:rPr lang="en-US" baseline="30000" dirty="0" smtClean="0"/>
-              <a:t>rd</a:t>
-            </a:r>
-            <a:r>
-              <a:rPr lang="en-US" dirty="0" smtClean="0"/>
-              <a:t>-Party-Frameworks</a:t>
-            </a:r>
           </a:p>
         </p:txBody>
       </p:sp>
       <p:pic>
         <p:nvPicPr>
-          <p:cNvPr id="9" name="Content Placeholder 8"/>
+          <p:cNvPr id="4" name="Content Placeholder 3"/>
           <p:cNvPicPr>
             <a:picLocks noGrp="1" noChangeAspect="1"/>
           </p:cNvPicPr>
@@ -8814,121 +9448,15 @@
         </p:blipFill>
         <p:spPr>
           <a:xfrm>
-            <a:off x="651204" y="4131995"/>
-            <a:ext cx="1969794" cy="939088"/>
+            <a:off x="1463040" y="1428750"/>
+            <a:ext cx="6217920" cy="4857750"/>
           </a:xfrm>
         </p:spPr>
       </p:pic>
-      <p:pic>
-        <p:nvPicPr>
-          <p:cNvPr id="11" name="Picture 10"/>
-          <p:cNvPicPr>
-            <a:picLocks noChangeAspect="1"/>
-          </p:cNvPicPr>
-          <p:nvPr/>
-        </p:nvPicPr>
-        <p:blipFill>
-          <a:blip r:embed="rId3">
-            <a:extLst>
-              <a:ext uri="{28A0092B-C50C-407E-A947-70E740481C1C}">
-                <a14:useLocalDpi xmlns:a14="http://schemas.microsoft.com/office/drawing/2010/main" val="0"/>
-              </a:ext>
-            </a:extLst>
-          </a:blip>
-          <a:stretch>
-            <a:fillRect/>
-          </a:stretch>
-        </p:blipFill>
-        <p:spPr>
-          <a:xfrm>
-            <a:off x="554745" y="1341336"/>
-            <a:ext cx="1996316" cy="1348389"/>
-          </a:xfrm>
-          <a:prstGeom prst="rect">
-            <a:avLst/>
-          </a:prstGeom>
-        </p:spPr>
-      </p:pic>
-      <p:pic>
-        <p:nvPicPr>
-          <p:cNvPr id="12" name="Picture 11"/>
-          <p:cNvPicPr>
-            <a:picLocks noChangeAspect="1"/>
-          </p:cNvPicPr>
-          <p:nvPr/>
-        </p:nvPicPr>
-        <p:blipFill>
-          <a:blip r:embed="rId4">
-            <a:extLst>
-              <a:ext uri="{28A0092B-C50C-407E-A947-70E740481C1C}">
-                <a14:useLocalDpi xmlns:a14="http://schemas.microsoft.com/office/drawing/2010/main" val="0"/>
-              </a:ext>
-            </a:extLst>
-          </a:blip>
-          <a:stretch>
-            <a:fillRect/>
-          </a:stretch>
-        </p:blipFill>
-        <p:spPr>
-          <a:xfrm>
-            <a:off x="1791576" y="2015530"/>
-            <a:ext cx="1928648" cy="1570587"/>
-          </a:xfrm>
-          <a:prstGeom prst="rect">
-            <a:avLst/>
-          </a:prstGeom>
-        </p:spPr>
-      </p:pic>
-      <p:sp>
-        <p:nvSpPr>
-          <p:cNvPr id="13" name="TextBox 12"/>
-          <p:cNvSpPr txBox="1"/>
-          <p:nvPr/>
-        </p:nvSpPr>
-        <p:spPr>
-          <a:xfrm>
-            <a:off x="4406461" y="4275229"/>
-            <a:ext cx="4564117" cy="646331"/>
-          </a:xfrm>
-          <a:prstGeom prst="rect">
-            <a:avLst/>
-          </a:prstGeom>
-          <a:noFill/>
-        </p:spPr>
-        <p:txBody>
-          <a:bodyPr wrap="square" rtlCol="0">
-            <a:spAutoFit/>
-          </a:bodyPr>
-          <a:lstStyle/>
-          <a:p>
-            <a:r>
-              <a:rPr lang="en-US" b="1" dirty="0" err="1" smtClean="0"/>
-              <a:t>Abstraktion</a:t>
-            </a:r>
-            <a:r>
-              <a:rPr lang="en-US" dirty="0" smtClean="0"/>
-              <a:t> von der </a:t>
-            </a:r>
-            <a:r>
-              <a:rPr lang="en-US" dirty="0" err="1" smtClean="0"/>
-              <a:t>konkreten</a:t>
-            </a:r>
-            <a:r>
-              <a:rPr lang="en-US" dirty="0" smtClean="0"/>
-              <a:t> </a:t>
-            </a:r>
-            <a:r>
-              <a:rPr lang="en-US" dirty="0" err="1" smtClean="0"/>
-              <a:t>Speicherimplementierung</a:t>
-            </a:r>
-            <a:endParaRPr lang="en-US" dirty="0" smtClean="0"/>
-          </a:p>
-        </p:txBody>
-      </p:sp>
     </p:spTree>
     <p:extLst>
       <p:ext uri="{BB962C8B-B14F-4D97-AF65-F5344CB8AC3E}">
-        <p14:creationId xmlns:p14="http://schemas.microsoft.com/office/powerpoint/2010/main" val="1828560639"/>
+        <p14:creationId xmlns:p14="http://schemas.microsoft.com/office/powerpoint/2010/main" val="330102494"/>
       </p:ext>
     </p:extLst>
   </p:cSld>
@@ -8983,7 +9511,7 @@
             </a:r>
             <a:r>
               <a:rPr lang="en-US" dirty="0" smtClean="0"/>
-              <a:t>: Proxy Pattern</a:t>
+              <a:t>: Shared Code Project</a:t>
             </a:r>
             <a:endParaRPr lang="en-US" dirty="0"/>
           </a:p>
@@ -9013,81 +9541,21 @@
         </p:blipFill>
         <p:spPr>
           <a:xfrm>
-            <a:off x="2771712" y="1709408"/>
-            <a:ext cx="5191204" cy="2417006"/>
+            <a:off x="819807" y="2209405"/>
+            <a:ext cx="7977352" cy="1185888"/>
           </a:xfrm>
         </p:spPr>
       </p:pic>
-      <p:pic>
-        <p:nvPicPr>
-          <p:cNvPr id="6" name="Picture 5"/>
-          <p:cNvPicPr>
-            <a:picLocks noChangeAspect="1"/>
-          </p:cNvPicPr>
-          <p:nvPr/>
-        </p:nvPicPr>
-        <p:blipFill>
-          <a:blip r:embed="rId3">
-            <a:extLst>
-              <a:ext uri="{28A0092B-C50C-407E-A947-70E740481C1C}">
-                <a14:useLocalDpi xmlns:a14="http://schemas.microsoft.com/office/drawing/2010/main" val="0"/>
-              </a:ext>
-            </a:extLst>
-          </a:blip>
-          <a:stretch>
-            <a:fillRect/>
-          </a:stretch>
-        </p:blipFill>
-        <p:spPr>
-          <a:xfrm>
-            <a:off x="1102115" y="2710305"/>
-            <a:ext cx="1669866" cy="942282"/>
-          </a:xfrm>
-          <a:prstGeom prst="rect">
-            <a:avLst/>
-          </a:prstGeom>
-        </p:spPr>
-      </p:pic>
-      <p:pic>
-        <p:nvPicPr>
-          <p:cNvPr id="7" name="Picture 6"/>
-          <p:cNvPicPr>
-            <a:picLocks noChangeAspect="1"/>
-          </p:cNvPicPr>
-          <p:nvPr/>
-        </p:nvPicPr>
-        <p:blipFill>
-          <a:blip r:embed="rId4">
-            <a:extLst>
-              <a:ext uri="{28A0092B-C50C-407E-A947-70E740481C1C}">
-                <a14:useLocalDpi xmlns:a14="http://schemas.microsoft.com/office/drawing/2010/main" val="0"/>
-              </a:ext>
-            </a:extLst>
-          </a:blip>
-          <a:stretch>
-            <a:fillRect/>
-          </a:stretch>
-        </p:blipFill>
-        <p:spPr>
-          <a:xfrm>
-            <a:off x="6484143" y="3664290"/>
-            <a:ext cx="1676751" cy="804840"/>
-          </a:xfrm>
-          <a:prstGeom prst="rect">
-            <a:avLst/>
-          </a:prstGeom>
-        </p:spPr>
-      </p:pic>
-      <p:sp>
-        <p:nvSpPr>
-          <p:cNvPr id="10" name="TextBox 9"/>
+      <p:sp>
+        <p:nvSpPr>
+          <p:cNvPr id="8" name="TextBox 7"/>
           <p:cNvSpPr txBox="1"/>
           <p:nvPr/>
         </p:nvSpPr>
         <p:spPr>
           <a:xfrm>
-            <a:off x="2068393" y="4684139"/>
-            <a:ext cx="5125827" cy="923330"/>
+            <a:off x="3318641" y="3413234"/>
+            <a:ext cx="2979683" cy="1938992"/>
           </a:xfrm>
           <a:prstGeom prst="rect">
             <a:avLst/>
@@ -9095,51 +9563,27 @@
           <a:noFill/>
         </p:spPr>
         <p:txBody>
-          <a:bodyPr wrap="none" rtlCol="0">
+          <a:bodyPr wrap="square" rtlCol="0">
             <a:spAutoFit/>
           </a:bodyPr>
           <a:lstStyle/>
           <a:p>
             <a:pPr algn="ctr"/>
             <a:r>
-              <a:rPr lang="en-US" b="1" dirty="0" err="1" smtClean="0"/>
-              <a:t>PageProxy</a:t>
-            </a:r>
-            <a:r>
-              <a:rPr lang="en-US" b="1" dirty="0" smtClean="0"/>
+              <a:rPr lang="en-US" sz="2200" dirty="0" err="1" smtClean="0"/>
+              <a:t>Gemeinsam</a:t>
+            </a:r>
+            <a:r>
+              <a:rPr lang="en-US" sz="2200" dirty="0" smtClean="0"/>
               <a:t> </a:t>
             </a:r>
             <a:r>
-              <a:rPr lang="en-US" b="1" dirty="0" err="1" smtClean="0"/>
-              <a:t>lädt</a:t>
-            </a:r>
-            <a:r>
-              <a:rPr lang="en-US" b="1" dirty="0" smtClean="0"/>
-              <a:t> </a:t>
-            </a:r>
-            <a:r>
-              <a:rPr lang="en-US" b="1" dirty="0" err="1" smtClean="0"/>
-              <a:t>Metadaten</a:t>
-            </a:r>
-            <a:r>
-              <a:rPr lang="en-US" b="1" dirty="0" smtClean="0"/>
-              <a:t> </a:t>
-            </a:r>
-            <a:r>
-              <a:rPr lang="en-US" dirty="0" err="1" smtClean="0"/>
-              <a:t>ohne</a:t>
-            </a:r>
-            <a:r>
-              <a:rPr lang="en-US" dirty="0" smtClean="0"/>
-              <a:t> </a:t>
-            </a:r>
-            <a:r>
-              <a:rPr lang="en-US" dirty="0" err="1" smtClean="0"/>
-              <a:t>zusätzlichen</a:t>
-            </a:r>
-            <a:r>
-              <a:rPr lang="en-US" dirty="0" smtClean="0"/>
-              <a:t> Traffic.</a:t>
+              <a:rPr lang="en-US" sz="2200" dirty="0" err="1" smtClean="0"/>
+              <a:t>genutzte</a:t>
+            </a:r>
+            <a:r>
+              <a:rPr lang="en-US" sz="2200" dirty="0" smtClean="0"/>
+              <a:t> Klassen</a:t>
             </a:r>
           </a:p>
           <a:p>
@@ -9148,62 +9592,82 @@
           </a:p>
           <a:p>
             <a:pPr algn="ctr"/>
-            <a:r>
-              <a:rPr lang="en-US" dirty="0" err="1" smtClean="0"/>
-              <a:t>Audiodateien</a:t>
-            </a:r>
-            <a:r>
-              <a:rPr lang="en-US" dirty="0" smtClean="0"/>
+            <a:endParaRPr lang="en-US" dirty="0" smtClean="0"/>
+          </a:p>
+          <a:p>
+            <a:pPr algn="ctr"/>
+            <a:endParaRPr lang="en-US" dirty="0" smtClean="0"/>
+          </a:p>
+          <a:p>
+            <a:pPr algn="ctr"/>
+            <a:r>
+              <a:rPr lang="en-US" sz="2200" b="1" dirty="0" err="1" smtClean="0"/>
+              <a:t>Keine</a:t>
+            </a:r>
+            <a:r>
+              <a:rPr lang="en-US" sz="2200" b="1" dirty="0" smtClean="0"/>
               <a:t> </a:t>
             </a:r>
             <a:r>
-              <a:rPr lang="en-US" dirty="0" err="1" smtClean="0"/>
-              <a:t>werden</a:t>
-            </a:r>
-            <a:r>
-              <a:rPr lang="en-US" dirty="0" smtClean="0"/>
-              <a:t> </a:t>
-            </a:r>
-            <a:r>
-              <a:rPr lang="en-US" dirty="0" err="1" smtClean="0"/>
-              <a:t>nur</a:t>
-            </a:r>
-            <a:r>
-              <a:rPr lang="en-US" dirty="0" smtClean="0"/>
-              <a:t> </a:t>
-            </a:r>
-            <a:r>
-              <a:rPr lang="en-US" b="1" dirty="0" err="1" smtClean="0"/>
-              <a:t>bei</a:t>
-            </a:r>
-            <a:r>
-              <a:rPr lang="en-US" b="1" dirty="0" smtClean="0"/>
-              <a:t> </a:t>
-            </a:r>
-            <a:r>
-              <a:rPr lang="en-US" b="1" dirty="0" err="1" smtClean="0"/>
-              <a:t>Bedarf</a:t>
-            </a:r>
-            <a:r>
-              <a:rPr lang="en-US" b="1" dirty="0" smtClean="0"/>
-              <a:t> </a:t>
-            </a:r>
-            <a:r>
-              <a:rPr lang="en-US" b="1" dirty="0" err="1" smtClean="0"/>
-              <a:t>geladen</a:t>
-            </a:r>
-            <a:r>
-              <a:rPr lang="en-US" b="1" dirty="0" smtClean="0"/>
-              <a:t>.</a:t>
-            </a:r>
-            <a:endParaRPr lang="en-US" b="1" dirty="0"/>
+              <a:rPr lang="en-US" sz="2200" b="1" dirty="0" err="1" smtClean="0"/>
+              <a:t>Redundanz</a:t>
+            </a:r>
+            <a:endParaRPr lang="en-US" sz="2200" b="1" dirty="0"/>
+          </a:p>
+        </p:txBody>
+      </p:sp>
+      <p:sp>
+        <p:nvSpPr>
+          <p:cNvPr id="9" name="Right Arrow 8"/>
+          <p:cNvSpPr/>
+          <p:nvPr/>
+        </p:nvSpPr>
+        <p:spPr>
+          <a:xfrm rot="5400000">
+            <a:off x="4481883" y="4391755"/>
+            <a:ext cx="653197" cy="425669"/>
+          </a:xfrm>
+          <a:prstGeom prst="rightArrow">
+            <a:avLst/>
+          </a:prstGeom>
+          <a:solidFill>
+            <a:schemeClr val="accent2"/>
+          </a:solidFill>
+          <a:ln>
+            <a:solidFill>
+              <a:schemeClr val="bg2"/>
+            </a:solidFill>
+          </a:ln>
+        </p:spPr>
+        <p:style>
+          <a:lnRef idx="2">
+            <a:schemeClr val="accent1">
+              <a:shade val="50000"/>
+            </a:schemeClr>
+          </a:lnRef>
+          <a:fillRef idx="1">
+            <a:schemeClr val="accent1"/>
+          </a:fillRef>
+          <a:effectRef idx="0">
+            <a:schemeClr val="accent1"/>
+          </a:effectRef>
+          <a:fontRef idx="minor">
+            <a:schemeClr val="lt1"/>
+          </a:fontRef>
+        </p:style>
+        <p:txBody>
+          <a:bodyPr rtlCol="0" anchor="ctr"/>
+          <a:lstStyle/>
+          <a:p>
+            <a:pPr algn="ctr"/>
+            <a:endParaRPr lang="en-US"/>
           </a:p>
         </p:txBody>
       </p:sp>
     </p:spTree>
     <p:extLst>
       <p:ext uri="{BB962C8B-B14F-4D97-AF65-F5344CB8AC3E}">
-        <p14:creationId xmlns:p14="http://schemas.microsoft.com/office/powerpoint/2010/main" val="1395683405"/>
+        <p14:creationId xmlns:p14="http://schemas.microsoft.com/office/powerpoint/2010/main" val="646822795"/>
       </p:ext>
     </p:extLst>
   </p:cSld>

</xml_diff>